<commit_message>
Added Design Pattern, Iterator, Interpreter, Command to presentation
</commit_message>
<xml_diff>
--- a/Behavioral_Design_Patterns.pptx
+++ b/Behavioral_Design_Patterns.pptx
@@ -6,14 +6,28 @@
   </p:sldMasterIdLst>
   <p:sldIdLst>
     <p:sldId id="256" r:id="rId2"/>
-    <p:sldId id="257" r:id="rId3"/>
-    <p:sldId id="258" r:id="rId4"/>
-    <p:sldId id="259" r:id="rId5"/>
-    <p:sldId id="260" r:id="rId6"/>
-    <p:sldId id="261" r:id="rId7"/>
-    <p:sldId id="262" r:id="rId8"/>
-    <p:sldId id="263" r:id="rId9"/>
-    <p:sldId id="264" r:id="rId10"/>
+    <p:sldId id="265" r:id="rId3"/>
+    <p:sldId id="257" r:id="rId4"/>
+    <p:sldId id="258" r:id="rId5"/>
+    <p:sldId id="259" r:id="rId6"/>
+    <p:sldId id="260" r:id="rId7"/>
+    <p:sldId id="261" r:id="rId8"/>
+    <p:sldId id="262" r:id="rId9"/>
+    <p:sldId id="263" r:id="rId10"/>
+    <p:sldId id="264" r:id="rId11"/>
+    <p:sldId id="266" r:id="rId12"/>
+    <p:sldId id="267" r:id="rId13"/>
+    <p:sldId id="268" r:id="rId14"/>
+    <p:sldId id="269" r:id="rId15"/>
+    <p:sldId id="270" r:id="rId16"/>
+    <p:sldId id="271" r:id="rId17"/>
+    <p:sldId id="272" r:id="rId18"/>
+    <p:sldId id="273" r:id="rId19"/>
+    <p:sldId id="274" r:id="rId20"/>
+    <p:sldId id="276" r:id="rId21"/>
+    <p:sldId id="277" r:id="rId22"/>
+    <p:sldId id="278" r:id="rId23"/>
+    <p:sldId id="279" r:id="rId24"/>
   </p:sldIdLst>
   <p:sldSz cx="12192000" cy="6858000"/>
   <p:notesSz cx="6858000" cy="9144000"/>
@@ -865,7 +879,7 @@
           <a:p>
             <a:fld id="{4319D03E-64F6-47F9-B8C3-2A716DE325DF}" type="datetimeFigureOut">
               <a:rPr lang="sk-SK" smtClean="0"/>
-              <a:t>3. 10. 2022</a:t>
+              <a:t>4. 10. 2022</a:t>
             </a:fld>
             <a:endParaRPr lang="sk-SK"/>
           </a:p>
@@ -1116,7 +1130,7 @@
           <a:p>
             <a:fld id="{4319D03E-64F6-47F9-B8C3-2A716DE325DF}" type="datetimeFigureOut">
               <a:rPr lang="sk-SK" smtClean="0"/>
-              <a:t>3. 10. 2022</a:t>
+              <a:t>4. 10. 2022</a:t>
             </a:fld>
             <a:endParaRPr lang="sk-SK"/>
           </a:p>
@@ -1430,7 +1444,7 @@
           <a:p>
             <a:fld id="{4319D03E-64F6-47F9-B8C3-2A716DE325DF}" type="datetimeFigureOut">
               <a:rPr lang="sk-SK" smtClean="0"/>
-              <a:t>3. 10. 2022</a:t>
+              <a:t>4. 10. 2022</a:t>
             </a:fld>
             <a:endParaRPr lang="sk-SK"/>
           </a:p>
@@ -1763,7 +1777,7 @@
           <a:p>
             <a:fld id="{4319D03E-64F6-47F9-B8C3-2A716DE325DF}" type="datetimeFigureOut">
               <a:rPr lang="sk-SK" smtClean="0"/>
-              <a:t>3. 10. 2022</a:t>
+              <a:t>4. 10. 2022</a:t>
             </a:fld>
             <a:endParaRPr lang="sk-SK"/>
           </a:p>
@@ -2077,7 +2091,7 @@
           <a:p>
             <a:fld id="{4319D03E-64F6-47F9-B8C3-2A716DE325DF}" type="datetimeFigureOut">
               <a:rPr lang="sk-SK" smtClean="0"/>
-              <a:t>3. 10. 2022</a:t>
+              <a:t>4. 10. 2022</a:t>
             </a:fld>
             <a:endParaRPr lang="sk-SK"/>
           </a:p>
@@ -2470,7 +2484,7 @@
           <a:p>
             <a:fld id="{4319D03E-64F6-47F9-B8C3-2A716DE325DF}" type="datetimeFigureOut">
               <a:rPr lang="sk-SK" smtClean="0"/>
-              <a:t>3. 10. 2022</a:t>
+              <a:t>4. 10. 2022</a:t>
             </a:fld>
             <a:endParaRPr lang="sk-SK"/>
           </a:p>
@@ -2640,7 +2654,7 @@
           <a:p>
             <a:fld id="{4319D03E-64F6-47F9-B8C3-2A716DE325DF}" type="datetimeFigureOut">
               <a:rPr lang="sk-SK" smtClean="0"/>
-              <a:t>3. 10. 2022</a:t>
+              <a:t>4. 10. 2022</a:t>
             </a:fld>
             <a:endParaRPr lang="sk-SK"/>
           </a:p>
@@ -2820,7 +2834,7 @@
           <a:p>
             <a:fld id="{4319D03E-64F6-47F9-B8C3-2A716DE325DF}" type="datetimeFigureOut">
               <a:rPr lang="sk-SK" smtClean="0"/>
-              <a:t>3. 10. 2022</a:t>
+              <a:t>4. 10. 2022</a:t>
             </a:fld>
             <a:endParaRPr lang="sk-SK"/>
           </a:p>
@@ -2990,7 +3004,7 @@
           <a:p>
             <a:fld id="{4319D03E-64F6-47F9-B8C3-2A716DE325DF}" type="datetimeFigureOut">
               <a:rPr lang="sk-SK" smtClean="0"/>
-              <a:t>3. 10. 2022</a:t>
+              <a:t>4. 10. 2022</a:t>
             </a:fld>
             <a:endParaRPr lang="sk-SK"/>
           </a:p>
@@ -3237,7 +3251,7 @@
           <a:p>
             <a:fld id="{4319D03E-64F6-47F9-B8C3-2A716DE325DF}" type="datetimeFigureOut">
               <a:rPr lang="sk-SK" smtClean="0"/>
-              <a:t>3. 10. 2022</a:t>
+              <a:t>4. 10. 2022</a:t>
             </a:fld>
             <a:endParaRPr lang="sk-SK"/>
           </a:p>
@@ -3469,7 +3483,7 @@
           <a:p>
             <a:fld id="{4319D03E-64F6-47F9-B8C3-2A716DE325DF}" type="datetimeFigureOut">
               <a:rPr lang="sk-SK" smtClean="0"/>
-              <a:t>3. 10. 2022</a:t>
+              <a:t>4. 10. 2022</a:t>
             </a:fld>
             <a:endParaRPr lang="sk-SK"/>
           </a:p>
@@ -3843,7 +3857,7 @@
           <a:p>
             <a:fld id="{4319D03E-64F6-47F9-B8C3-2A716DE325DF}" type="datetimeFigureOut">
               <a:rPr lang="sk-SK" smtClean="0"/>
-              <a:t>3. 10. 2022</a:t>
+              <a:t>4. 10. 2022</a:t>
             </a:fld>
             <a:endParaRPr lang="sk-SK"/>
           </a:p>
@@ -3966,7 +3980,7 @@
           <a:p>
             <a:fld id="{4319D03E-64F6-47F9-B8C3-2A716DE325DF}" type="datetimeFigureOut">
               <a:rPr lang="sk-SK" smtClean="0"/>
-              <a:t>3. 10. 2022</a:t>
+              <a:t>4. 10. 2022</a:t>
             </a:fld>
             <a:endParaRPr lang="sk-SK"/>
           </a:p>
@@ -4061,7 +4075,7 @@
           <a:p>
             <a:fld id="{4319D03E-64F6-47F9-B8C3-2A716DE325DF}" type="datetimeFigureOut">
               <a:rPr lang="sk-SK" smtClean="0"/>
-              <a:t>3. 10. 2022</a:t>
+              <a:t>4. 10. 2022</a:t>
             </a:fld>
             <a:endParaRPr lang="sk-SK"/>
           </a:p>
@@ -4316,7 +4330,7 @@
           <a:p>
             <a:fld id="{4319D03E-64F6-47F9-B8C3-2A716DE325DF}" type="datetimeFigureOut">
               <a:rPr lang="sk-SK" smtClean="0"/>
-              <a:t>3. 10. 2022</a:t>
+              <a:t>4. 10. 2022</a:t>
             </a:fld>
             <a:endParaRPr lang="sk-SK"/>
           </a:p>
@@ -4621,7 +4635,7 @@
           <a:p>
             <a:fld id="{4319D03E-64F6-47F9-B8C3-2A716DE325DF}" type="datetimeFigureOut">
               <a:rPr lang="sk-SK" smtClean="0"/>
-              <a:t>3. 10. 2022</a:t>
+              <a:t>4. 10. 2022</a:t>
             </a:fld>
             <a:endParaRPr lang="sk-SK"/>
           </a:p>
@@ -5323,7 +5337,7 @@
           <a:p>
             <a:fld id="{4319D03E-64F6-47F9-B8C3-2A716DE325DF}" type="datetimeFigureOut">
               <a:rPr lang="sk-SK" smtClean="0"/>
-              <a:t>3. 10. 2022</a:t>
+              <a:t>4. 10. 2022</a:t>
             </a:fld>
             <a:endParaRPr lang="sk-SK"/>
           </a:p>
@@ -5934,6 +5948,1732 @@
 </p:sld>
 </file>
 
+<file path=ppt/slides/slide10.xml><?xml version="1.0" encoding="utf-8"?>
+<p:sld xmlns:a="http://schemas.openxmlformats.org/drawingml/2006/main" xmlns:r="http://schemas.openxmlformats.org/officeDocument/2006/relationships" xmlns:p="http://schemas.openxmlformats.org/presentationml/2006/main">
+  <p:cSld>
+    <p:spTree>
+      <p:nvGrpSpPr>
+        <p:cNvPr id="1" name=""/>
+        <p:cNvGrpSpPr/>
+        <p:nvPr/>
+      </p:nvGrpSpPr>
+      <p:grpSpPr>
+        <a:xfrm>
+          <a:off x="0" y="0"/>
+          <a:ext cx="0" cy="0"/>
+          <a:chOff x="0" y="0"/>
+          <a:chExt cx="0" cy="0"/>
+        </a:xfrm>
+      </p:grpSpPr>
+      <p:sp>
+        <p:nvSpPr>
+          <p:cNvPr id="2" name="Nadpis 1">
+            <a:extLst>
+              <a:ext uri="{FF2B5EF4-FFF2-40B4-BE49-F238E27FC236}">
+                <a16:creationId xmlns:a16="http://schemas.microsoft.com/office/drawing/2014/main" id="{591A6B69-96CE-55D5-96F6-D1DE5F9F0746}"/>
+              </a:ext>
+            </a:extLst>
+          </p:cNvPr>
+          <p:cNvSpPr>
+            <a:spLocks noGrp="1"/>
+          </p:cNvSpPr>
+          <p:nvPr>
+            <p:ph type="title"/>
+          </p:nvPr>
+        </p:nvSpPr>
+        <p:spPr/>
+        <p:txBody>
+          <a:bodyPr/>
+          <a:lstStyle/>
+          <a:p>
+            <a:r>
+              <a:rPr lang="sk-SK" dirty="0" err="1"/>
+              <a:t>Chain</a:t>
+            </a:r>
+            <a:r>
+              <a:rPr lang="sk-SK" dirty="0"/>
+              <a:t> of </a:t>
+            </a:r>
+            <a:r>
+              <a:rPr lang="sk-SK" dirty="0" err="1"/>
+              <a:t>Responibility</a:t>
+            </a:r>
+            <a:r>
+              <a:rPr lang="sk-SK" dirty="0"/>
+              <a:t> - štruktúra</a:t>
+            </a:r>
+          </a:p>
+        </p:txBody>
+      </p:sp>
+      <p:pic>
+        <p:nvPicPr>
+          <p:cNvPr id="4098" name="Picture 2" descr="Structure of the Chain Of Responsibility design pattern">
+            <a:extLst>
+              <a:ext uri="{FF2B5EF4-FFF2-40B4-BE49-F238E27FC236}">
+                <a16:creationId xmlns:a16="http://schemas.microsoft.com/office/drawing/2014/main" id="{49D6E090-7C4F-45B0-FE97-95D35FF11828}"/>
+              </a:ext>
+            </a:extLst>
+          </p:cNvPr>
+          <p:cNvPicPr>
+            <a:picLocks noGrp="1" noChangeAspect="1" noChangeArrowheads="1"/>
+          </p:cNvPicPr>
+          <p:nvPr>
+            <p:ph idx="1"/>
+          </p:nvPr>
+        </p:nvPicPr>
+        <p:blipFill>
+          <a:blip r:embed="rId2">
+            <a:extLst>
+              <a:ext uri="{28A0092B-C50C-407E-A947-70E740481C1C}">
+                <a14:useLocalDpi xmlns:a14="http://schemas.microsoft.com/office/drawing/2010/main" val="0"/>
+              </a:ext>
+            </a:extLst>
+          </a:blip>
+          <a:srcRect/>
+          <a:stretch>
+            <a:fillRect/>
+          </a:stretch>
+        </p:blipFill>
+        <p:spPr bwMode="auto">
+          <a:xfrm>
+            <a:off x="3177304" y="2160588"/>
+            <a:ext cx="3597429" cy="3881437"/>
+          </a:xfrm>
+          <a:prstGeom prst="rect">
+            <a:avLst/>
+          </a:prstGeom>
+          <a:noFill/>
+          <a:extLst>
+            <a:ext uri="{909E8E84-426E-40DD-AFC4-6F175D3DCCD1}">
+              <a14:hiddenFill xmlns:a14="http://schemas.microsoft.com/office/drawing/2010/main">
+                <a:solidFill>
+                  <a:srgbClr val="FFFFFF"/>
+                </a:solidFill>
+              </a14:hiddenFill>
+            </a:ext>
+          </a:extLst>
+        </p:spPr>
+      </p:pic>
+    </p:spTree>
+    <p:extLst>
+      <p:ext uri="{BB962C8B-B14F-4D97-AF65-F5344CB8AC3E}">
+        <p14:creationId xmlns:p14="http://schemas.microsoft.com/office/powerpoint/2010/main" val="773094169"/>
+      </p:ext>
+    </p:extLst>
+  </p:cSld>
+  <p:clrMapOvr>
+    <a:masterClrMapping/>
+  </p:clrMapOvr>
+</p:sld>
+</file>
+
+<file path=ppt/slides/slide11.xml><?xml version="1.0" encoding="utf-8"?>
+<p:sld xmlns:a="http://schemas.openxmlformats.org/drawingml/2006/main" xmlns:r="http://schemas.openxmlformats.org/officeDocument/2006/relationships" xmlns:p="http://schemas.openxmlformats.org/presentationml/2006/main">
+  <p:cSld>
+    <p:spTree>
+      <p:nvGrpSpPr>
+        <p:cNvPr id="1" name=""/>
+        <p:cNvGrpSpPr/>
+        <p:nvPr/>
+      </p:nvGrpSpPr>
+      <p:grpSpPr>
+        <a:xfrm>
+          <a:off x="0" y="0"/>
+          <a:ext cx="0" cy="0"/>
+          <a:chOff x="0" y="0"/>
+          <a:chExt cx="0" cy="0"/>
+        </a:xfrm>
+      </p:grpSpPr>
+      <p:sp>
+        <p:nvSpPr>
+          <p:cNvPr id="2" name="Title 1">
+            <a:extLst>
+              <a:ext uri="{FF2B5EF4-FFF2-40B4-BE49-F238E27FC236}">
+                <a16:creationId xmlns:a16="http://schemas.microsoft.com/office/drawing/2014/main" id="{DCD84134-5E9E-4D7C-95CC-F3BC1CA1D5EC}"/>
+              </a:ext>
+            </a:extLst>
+          </p:cNvPr>
+          <p:cNvSpPr>
+            <a:spLocks noGrp="1"/>
+          </p:cNvSpPr>
+          <p:nvPr>
+            <p:ph type="title"/>
+          </p:nvPr>
+        </p:nvSpPr>
+        <p:spPr/>
+        <p:txBody>
+          <a:bodyPr/>
+          <a:lstStyle/>
+          <a:p>
+            <a:r>
+              <a:rPr lang="en-US" dirty="0"/>
+              <a:t>Command</a:t>
+            </a:r>
+          </a:p>
+        </p:txBody>
+      </p:sp>
+      <p:sp>
+        <p:nvSpPr>
+          <p:cNvPr id="3" name="Content Placeholder 2">
+            <a:extLst>
+              <a:ext uri="{FF2B5EF4-FFF2-40B4-BE49-F238E27FC236}">
+                <a16:creationId xmlns:a16="http://schemas.microsoft.com/office/drawing/2014/main" id="{8FD20D94-A8A5-4E19-9EEA-AC7D02A3ED28}"/>
+              </a:ext>
+            </a:extLst>
+          </p:cNvPr>
+          <p:cNvSpPr>
+            <a:spLocks noGrp="1"/>
+          </p:cNvSpPr>
+          <p:nvPr>
+            <p:ph idx="1"/>
+          </p:nvPr>
+        </p:nvSpPr>
+        <p:spPr/>
+        <p:txBody>
+          <a:bodyPr/>
+          <a:lstStyle/>
+          <a:p>
+            <a:r>
+              <a:rPr lang="en-US" dirty="0" err="1"/>
+              <a:t>Mení</a:t>
+            </a:r>
+            <a:r>
+              <a:rPr lang="en-US" dirty="0"/>
+              <a:t> </a:t>
+            </a:r>
+            <a:r>
+              <a:rPr lang="en-US" dirty="0" err="1"/>
+              <a:t>požiadavku</a:t>
+            </a:r>
+            <a:r>
+              <a:rPr lang="en-US" dirty="0"/>
+              <a:t> </a:t>
+            </a:r>
+            <a:r>
+              <a:rPr lang="en-US" dirty="0" err="1"/>
+              <a:t>na</a:t>
+            </a:r>
+            <a:r>
+              <a:rPr lang="en-US" dirty="0"/>
+              <a:t> </a:t>
+            </a:r>
+            <a:r>
+              <a:rPr lang="en-US" dirty="0" err="1"/>
+              <a:t>samotný</a:t>
+            </a:r>
+            <a:r>
+              <a:rPr lang="en-US" dirty="0"/>
+              <a:t> </a:t>
+            </a:r>
+            <a:r>
+              <a:rPr lang="en-US" dirty="0" err="1"/>
+              <a:t>objekt</a:t>
+            </a:r>
+            <a:r>
+              <a:rPr lang="en-US" dirty="0"/>
+              <a:t> </a:t>
+            </a:r>
+            <a:r>
+              <a:rPr lang="en-US" dirty="0" err="1"/>
+              <a:t>ktorý</a:t>
+            </a:r>
+            <a:r>
+              <a:rPr lang="en-US" dirty="0"/>
+              <a:t> </a:t>
+            </a:r>
+            <a:r>
+              <a:rPr lang="en-US" dirty="0" err="1"/>
+              <a:t>obsahuje</a:t>
+            </a:r>
+            <a:r>
+              <a:rPr lang="en-US" dirty="0"/>
+              <a:t> </a:t>
+            </a:r>
+            <a:r>
+              <a:rPr lang="en-US" dirty="0" err="1"/>
+              <a:t>všetky</a:t>
+            </a:r>
+            <a:r>
+              <a:rPr lang="en-US" dirty="0"/>
+              <a:t> </a:t>
+            </a:r>
+            <a:r>
+              <a:rPr lang="en-US" dirty="0" err="1"/>
+              <a:t>potrebné</a:t>
+            </a:r>
+            <a:r>
+              <a:rPr lang="en-US" dirty="0"/>
+              <a:t> </a:t>
+            </a:r>
+            <a:r>
+              <a:rPr lang="en-US" dirty="0" err="1"/>
+              <a:t>informácie</a:t>
+            </a:r>
+            <a:endParaRPr lang="en-US" dirty="0"/>
+          </a:p>
+          <a:p>
+            <a:endParaRPr lang="en-US" dirty="0"/>
+          </a:p>
+        </p:txBody>
+      </p:sp>
+      <p:pic>
+        <p:nvPicPr>
+          <p:cNvPr id="5" name="Picture 4" descr="A picture containing text&#10;&#10;Description automatically generated">
+            <a:extLst>
+              <a:ext uri="{FF2B5EF4-FFF2-40B4-BE49-F238E27FC236}">
+                <a16:creationId xmlns:a16="http://schemas.microsoft.com/office/drawing/2014/main" id="{3EC78AEA-4607-4705-A895-5C7D17F70AB7}"/>
+              </a:ext>
+            </a:extLst>
+          </p:cNvPr>
+          <p:cNvPicPr>
+            <a:picLocks noChangeAspect="1"/>
+          </p:cNvPicPr>
+          <p:nvPr/>
+        </p:nvPicPr>
+        <p:blipFill>
+          <a:blip r:embed="rId2">
+            <a:extLst>
+              <a:ext uri="{28A0092B-C50C-407E-A947-70E740481C1C}">
+                <a14:useLocalDpi xmlns:a14="http://schemas.microsoft.com/office/drawing/2010/main" val="0"/>
+              </a:ext>
+            </a:extLst>
+          </a:blip>
+          <a:stretch>
+            <a:fillRect/>
+          </a:stretch>
+        </p:blipFill>
+        <p:spPr>
+          <a:xfrm>
+            <a:off x="2917998" y="2974108"/>
+            <a:ext cx="4784436" cy="2990273"/>
+          </a:xfrm>
+          <a:prstGeom prst="rect">
+            <a:avLst/>
+          </a:prstGeom>
+        </p:spPr>
+      </p:pic>
+    </p:spTree>
+    <p:extLst>
+      <p:ext uri="{BB962C8B-B14F-4D97-AF65-F5344CB8AC3E}">
+        <p14:creationId xmlns:p14="http://schemas.microsoft.com/office/powerpoint/2010/main" val="1898981524"/>
+      </p:ext>
+    </p:extLst>
+  </p:cSld>
+  <p:clrMapOvr>
+    <a:masterClrMapping/>
+  </p:clrMapOvr>
+</p:sld>
+</file>
+
+<file path=ppt/slides/slide12.xml><?xml version="1.0" encoding="utf-8"?>
+<p:sld xmlns:a="http://schemas.openxmlformats.org/drawingml/2006/main" xmlns:r="http://schemas.openxmlformats.org/officeDocument/2006/relationships" xmlns:p="http://schemas.openxmlformats.org/presentationml/2006/main">
+  <p:cSld>
+    <p:spTree>
+      <p:nvGrpSpPr>
+        <p:cNvPr id="1" name=""/>
+        <p:cNvGrpSpPr/>
+        <p:nvPr/>
+      </p:nvGrpSpPr>
+      <p:grpSpPr>
+        <a:xfrm>
+          <a:off x="0" y="0"/>
+          <a:ext cx="0" cy="0"/>
+          <a:chOff x="0" y="0"/>
+          <a:chExt cx="0" cy="0"/>
+        </a:xfrm>
+      </p:grpSpPr>
+      <p:sp>
+        <p:nvSpPr>
+          <p:cNvPr id="2" name="Title 1">
+            <a:extLst>
+              <a:ext uri="{FF2B5EF4-FFF2-40B4-BE49-F238E27FC236}">
+                <a16:creationId xmlns:a16="http://schemas.microsoft.com/office/drawing/2014/main" id="{DCD84134-5E9E-4D7C-95CC-F3BC1CA1D5EC}"/>
+              </a:ext>
+            </a:extLst>
+          </p:cNvPr>
+          <p:cNvSpPr>
+            <a:spLocks noGrp="1"/>
+          </p:cNvSpPr>
+          <p:nvPr>
+            <p:ph type="title"/>
+          </p:nvPr>
+        </p:nvSpPr>
+        <p:spPr/>
+        <p:txBody>
+          <a:bodyPr/>
+          <a:lstStyle/>
+          <a:p>
+            <a:r>
+              <a:rPr lang="en-US" dirty="0"/>
+              <a:t>Command - </a:t>
+            </a:r>
+            <a:r>
+              <a:rPr lang="en-US" dirty="0" err="1"/>
+              <a:t>problém</a:t>
+            </a:r>
+            <a:endParaRPr lang="en-US" dirty="0"/>
+          </a:p>
+        </p:txBody>
+      </p:sp>
+      <p:sp>
+        <p:nvSpPr>
+          <p:cNvPr id="3" name="Content Placeholder 2">
+            <a:extLst>
+              <a:ext uri="{FF2B5EF4-FFF2-40B4-BE49-F238E27FC236}">
+                <a16:creationId xmlns:a16="http://schemas.microsoft.com/office/drawing/2014/main" id="{8FD20D94-A8A5-4E19-9EEA-AC7D02A3ED28}"/>
+              </a:ext>
+            </a:extLst>
+          </p:cNvPr>
+          <p:cNvSpPr>
+            <a:spLocks noGrp="1"/>
+          </p:cNvSpPr>
+          <p:nvPr>
+            <p:ph idx="1"/>
+          </p:nvPr>
+        </p:nvSpPr>
+        <p:spPr/>
+        <p:txBody>
+          <a:bodyPr/>
+          <a:lstStyle/>
+          <a:p>
+            <a:r>
+              <a:rPr lang="en-US" dirty="0" err="1"/>
+              <a:t>Objekt</a:t>
+            </a:r>
+            <a:r>
+              <a:rPr lang="en-US" dirty="0"/>
+              <a:t> </a:t>
+            </a:r>
+            <a:r>
+              <a:rPr lang="en-US" dirty="0" err="1"/>
+              <a:t>má</a:t>
+            </a:r>
+            <a:r>
+              <a:rPr lang="en-US" dirty="0"/>
+              <a:t> pre </a:t>
+            </a:r>
+            <a:r>
+              <a:rPr lang="en-US" dirty="0" err="1"/>
+              <a:t>rôzne</a:t>
+            </a:r>
+            <a:r>
+              <a:rPr lang="en-US" dirty="0"/>
+              <a:t> </a:t>
+            </a:r>
+            <a:r>
+              <a:rPr lang="en-US" dirty="0" err="1"/>
+              <a:t>eventy</a:t>
+            </a:r>
+            <a:r>
+              <a:rPr lang="en-US" dirty="0"/>
+              <a:t> </a:t>
+            </a:r>
+            <a:r>
+              <a:rPr lang="en-US" dirty="0" err="1"/>
+              <a:t>vykonať</a:t>
+            </a:r>
+            <a:r>
+              <a:rPr lang="en-US" dirty="0"/>
+              <a:t> </a:t>
+            </a:r>
+            <a:r>
+              <a:rPr lang="en-US" dirty="0" err="1"/>
+              <a:t>rôzne</a:t>
+            </a:r>
+            <a:r>
+              <a:rPr lang="en-US" dirty="0"/>
+              <a:t> </a:t>
+            </a:r>
+            <a:r>
+              <a:rPr lang="en-US" dirty="0" err="1"/>
+              <a:t>úkony</a:t>
+            </a:r>
+            <a:endParaRPr lang="en-US" dirty="0"/>
+          </a:p>
+          <a:p>
+            <a:r>
+              <a:rPr lang="en-US" dirty="0" err="1"/>
+              <a:t>Veľké</a:t>
+            </a:r>
+            <a:r>
+              <a:rPr lang="en-US" dirty="0"/>
+              <a:t> </a:t>
+            </a:r>
+            <a:r>
+              <a:rPr lang="en-US" dirty="0" err="1"/>
+              <a:t>množstvo</a:t>
+            </a:r>
+            <a:r>
+              <a:rPr lang="en-US" dirty="0"/>
+              <a:t> </a:t>
+            </a:r>
+            <a:r>
+              <a:rPr lang="en-US" dirty="0" err="1"/>
+              <a:t>podtried</a:t>
+            </a:r>
+            <a:endParaRPr lang="en-US" dirty="0"/>
+          </a:p>
+          <a:p>
+            <a:endParaRPr lang="en-US" dirty="0"/>
+          </a:p>
+          <a:p>
+            <a:endParaRPr lang="en-US" dirty="0"/>
+          </a:p>
+        </p:txBody>
+      </p:sp>
+      <p:pic>
+        <p:nvPicPr>
+          <p:cNvPr id="6" name="Picture 5" descr="Diagram, text&#10;&#10;Description automatically generated">
+            <a:extLst>
+              <a:ext uri="{FF2B5EF4-FFF2-40B4-BE49-F238E27FC236}">
+                <a16:creationId xmlns:a16="http://schemas.microsoft.com/office/drawing/2014/main" id="{F709E812-F2E0-4B27-B962-E87D35146F1A}"/>
+              </a:ext>
+            </a:extLst>
+          </p:cNvPr>
+          <p:cNvPicPr>
+            <a:picLocks noChangeAspect="1"/>
+          </p:cNvPicPr>
+          <p:nvPr/>
+        </p:nvPicPr>
+        <p:blipFill>
+          <a:blip r:embed="rId2">
+            <a:extLst>
+              <a:ext uri="{28A0092B-C50C-407E-A947-70E740481C1C}">
+                <a14:useLocalDpi xmlns:a14="http://schemas.microsoft.com/office/drawing/2010/main" val="0"/>
+              </a:ext>
+            </a:extLst>
+          </a:blip>
+          <a:stretch>
+            <a:fillRect/>
+          </a:stretch>
+        </p:blipFill>
+        <p:spPr>
+          <a:xfrm>
+            <a:off x="2917998" y="3225800"/>
+            <a:ext cx="4481945" cy="2128924"/>
+          </a:xfrm>
+          <a:prstGeom prst="rect">
+            <a:avLst/>
+          </a:prstGeom>
+        </p:spPr>
+      </p:pic>
+    </p:spTree>
+    <p:extLst>
+      <p:ext uri="{BB962C8B-B14F-4D97-AF65-F5344CB8AC3E}">
+        <p14:creationId xmlns:p14="http://schemas.microsoft.com/office/powerpoint/2010/main" val="651923377"/>
+      </p:ext>
+    </p:extLst>
+  </p:cSld>
+  <p:clrMapOvr>
+    <a:masterClrMapping/>
+  </p:clrMapOvr>
+</p:sld>
+</file>
+
+<file path=ppt/slides/slide13.xml><?xml version="1.0" encoding="utf-8"?>
+<p:sld xmlns:a="http://schemas.openxmlformats.org/drawingml/2006/main" xmlns:r="http://schemas.openxmlformats.org/officeDocument/2006/relationships" xmlns:p="http://schemas.openxmlformats.org/presentationml/2006/main">
+  <p:cSld>
+    <p:spTree>
+      <p:nvGrpSpPr>
+        <p:cNvPr id="1" name=""/>
+        <p:cNvGrpSpPr/>
+        <p:nvPr/>
+      </p:nvGrpSpPr>
+      <p:grpSpPr>
+        <a:xfrm>
+          <a:off x="0" y="0"/>
+          <a:ext cx="0" cy="0"/>
+          <a:chOff x="0" y="0"/>
+          <a:chExt cx="0" cy="0"/>
+        </a:xfrm>
+      </p:grpSpPr>
+      <p:sp>
+        <p:nvSpPr>
+          <p:cNvPr id="2" name="Title 1">
+            <a:extLst>
+              <a:ext uri="{FF2B5EF4-FFF2-40B4-BE49-F238E27FC236}">
+                <a16:creationId xmlns:a16="http://schemas.microsoft.com/office/drawing/2014/main" id="{DCD84134-5E9E-4D7C-95CC-F3BC1CA1D5EC}"/>
+              </a:ext>
+            </a:extLst>
+          </p:cNvPr>
+          <p:cNvSpPr>
+            <a:spLocks noGrp="1"/>
+          </p:cNvSpPr>
+          <p:nvPr>
+            <p:ph type="title"/>
+          </p:nvPr>
+        </p:nvSpPr>
+        <p:spPr/>
+        <p:txBody>
+          <a:bodyPr/>
+          <a:lstStyle/>
+          <a:p>
+            <a:r>
+              <a:rPr lang="en-US" dirty="0"/>
+              <a:t>Command - </a:t>
+            </a:r>
+            <a:r>
+              <a:rPr lang="en-US" dirty="0" err="1"/>
+              <a:t>riešenie</a:t>
+            </a:r>
+            <a:endParaRPr lang="en-US" dirty="0"/>
+          </a:p>
+        </p:txBody>
+      </p:sp>
+      <p:sp>
+        <p:nvSpPr>
+          <p:cNvPr id="3" name="Content Placeholder 2">
+            <a:extLst>
+              <a:ext uri="{FF2B5EF4-FFF2-40B4-BE49-F238E27FC236}">
+                <a16:creationId xmlns:a16="http://schemas.microsoft.com/office/drawing/2014/main" id="{8FD20D94-A8A5-4E19-9EEA-AC7D02A3ED28}"/>
+              </a:ext>
+            </a:extLst>
+          </p:cNvPr>
+          <p:cNvSpPr>
+            <a:spLocks noGrp="1"/>
+          </p:cNvSpPr>
+          <p:nvPr>
+            <p:ph idx="1"/>
+          </p:nvPr>
+        </p:nvSpPr>
+        <p:spPr/>
+        <p:txBody>
+          <a:bodyPr/>
+          <a:lstStyle/>
+          <a:p>
+            <a:r>
+              <a:rPr lang="en-US" dirty="0" err="1"/>
+              <a:t>Extrakcia</a:t>
+            </a:r>
+            <a:r>
+              <a:rPr lang="en-US" dirty="0"/>
+              <a:t> </a:t>
+            </a:r>
+            <a:r>
+              <a:rPr lang="en-US" dirty="0" err="1"/>
+              <a:t>detailov</a:t>
+            </a:r>
+            <a:r>
+              <a:rPr lang="en-US" dirty="0"/>
+              <a:t> </a:t>
+            </a:r>
+            <a:r>
+              <a:rPr lang="en-US" dirty="0" err="1"/>
+              <a:t>požiadavky</a:t>
+            </a:r>
+            <a:r>
+              <a:rPr lang="en-US" dirty="0"/>
+              <a:t> do </a:t>
+            </a:r>
+            <a:r>
+              <a:rPr lang="en-US" dirty="0" err="1"/>
+              <a:t>jednej</a:t>
+            </a:r>
+            <a:r>
+              <a:rPr lang="en-US" dirty="0"/>
+              <a:t> </a:t>
+            </a:r>
+            <a:r>
+              <a:rPr lang="en-US" dirty="0" err="1"/>
+              <a:t>metódy</a:t>
+            </a:r>
+            <a:r>
+              <a:rPr lang="en-US" dirty="0"/>
+              <a:t> v command </a:t>
+            </a:r>
+            <a:r>
+              <a:rPr lang="en-US" dirty="0" err="1"/>
+              <a:t>triede</a:t>
+            </a:r>
+            <a:endParaRPr lang="en-US" dirty="0"/>
+          </a:p>
+          <a:p>
+            <a:r>
+              <a:rPr lang="en-US" dirty="0"/>
+              <a:t>Command </a:t>
+            </a:r>
+            <a:r>
+              <a:rPr lang="en-US" dirty="0" err="1"/>
+              <a:t>ako</a:t>
+            </a:r>
+            <a:r>
+              <a:rPr lang="en-US" dirty="0"/>
+              <a:t> </a:t>
+            </a:r>
+            <a:r>
+              <a:rPr lang="en-US" dirty="0" err="1"/>
+              <a:t>prostredník</a:t>
+            </a:r>
+            <a:r>
+              <a:rPr lang="en-US" dirty="0"/>
+              <a:t> </a:t>
+            </a:r>
+            <a:r>
+              <a:rPr lang="en-US" dirty="0" err="1"/>
+              <a:t>medzi</a:t>
+            </a:r>
+            <a:r>
+              <a:rPr lang="en-US" dirty="0"/>
+              <a:t> GUI a business logic</a:t>
+            </a:r>
+          </a:p>
+          <a:p>
+            <a:endParaRPr lang="en-US" dirty="0"/>
+          </a:p>
+          <a:p>
+            <a:endParaRPr lang="en-US" dirty="0"/>
+          </a:p>
+        </p:txBody>
+      </p:sp>
+      <p:pic>
+        <p:nvPicPr>
+          <p:cNvPr id="5" name="Picture 4" descr="Diagram&#10;&#10;Description automatically generated">
+            <a:extLst>
+              <a:ext uri="{FF2B5EF4-FFF2-40B4-BE49-F238E27FC236}">
+                <a16:creationId xmlns:a16="http://schemas.microsoft.com/office/drawing/2014/main" id="{0F278E00-C290-48B8-9C59-96CE105A28AC}"/>
+              </a:ext>
+            </a:extLst>
+          </p:cNvPr>
+          <p:cNvPicPr>
+            <a:picLocks noChangeAspect="1"/>
+          </p:cNvPicPr>
+          <p:nvPr/>
+        </p:nvPicPr>
+        <p:blipFill>
+          <a:blip r:embed="rId2">
+            <a:extLst>
+              <a:ext uri="{28A0092B-C50C-407E-A947-70E740481C1C}">
+                <a14:useLocalDpi xmlns:a14="http://schemas.microsoft.com/office/drawing/2010/main" val="0"/>
+              </a:ext>
+            </a:extLst>
+          </a:blip>
+          <a:stretch>
+            <a:fillRect/>
+          </a:stretch>
+        </p:blipFill>
+        <p:spPr>
+          <a:xfrm>
+            <a:off x="2356292" y="3429000"/>
+            <a:ext cx="5720851" cy="1976294"/>
+          </a:xfrm>
+          <a:prstGeom prst="rect">
+            <a:avLst/>
+          </a:prstGeom>
+        </p:spPr>
+      </p:pic>
+    </p:spTree>
+    <p:extLst>
+      <p:ext uri="{BB962C8B-B14F-4D97-AF65-F5344CB8AC3E}">
+        <p14:creationId xmlns:p14="http://schemas.microsoft.com/office/powerpoint/2010/main" val="4022655717"/>
+      </p:ext>
+    </p:extLst>
+  </p:cSld>
+  <p:clrMapOvr>
+    <a:masterClrMapping/>
+  </p:clrMapOvr>
+</p:sld>
+</file>
+
+<file path=ppt/slides/slide14.xml><?xml version="1.0" encoding="utf-8"?>
+<p:sld xmlns:a="http://schemas.openxmlformats.org/drawingml/2006/main" xmlns:r="http://schemas.openxmlformats.org/officeDocument/2006/relationships" xmlns:p="http://schemas.openxmlformats.org/presentationml/2006/main">
+  <p:cSld>
+    <p:spTree>
+      <p:nvGrpSpPr>
+        <p:cNvPr id="1" name=""/>
+        <p:cNvGrpSpPr/>
+        <p:nvPr/>
+      </p:nvGrpSpPr>
+      <p:grpSpPr>
+        <a:xfrm>
+          <a:off x="0" y="0"/>
+          <a:ext cx="0" cy="0"/>
+          <a:chOff x="0" y="0"/>
+          <a:chExt cx="0" cy="0"/>
+        </a:xfrm>
+      </p:grpSpPr>
+      <p:sp>
+        <p:nvSpPr>
+          <p:cNvPr id="2" name="Title 1">
+            <a:extLst>
+              <a:ext uri="{FF2B5EF4-FFF2-40B4-BE49-F238E27FC236}">
+                <a16:creationId xmlns:a16="http://schemas.microsoft.com/office/drawing/2014/main" id="{DCD84134-5E9E-4D7C-95CC-F3BC1CA1D5EC}"/>
+              </a:ext>
+            </a:extLst>
+          </p:cNvPr>
+          <p:cNvSpPr>
+            <a:spLocks noGrp="1"/>
+          </p:cNvSpPr>
+          <p:nvPr>
+            <p:ph type="title"/>
+          </p:nvPr>
+        </p:nvSpPr>
+        <p:spPr/>
+        <p:txBody>
+          <a:bodyPr/>
+          <a:lstStyle/>
+          <a:p>
+            <a:r>
+              <a:rPr lang="en-US" dirty="0"/>
+              <a:t>Command - </a:t>
+            </a:r>
+            <a:r>
+              <a:rPr lang="sk-SK" dirty="0"/>
+              <a:t>príklad z reálneho sveta</a:t>
+            </a:r>
+            <a:endParaRPr lang="en-US" dirty="0"/>
+          </a:p>
+        </p:txBody>
+      </p:sp>
+      <p:sp>
+        <p:nvSpPr>
+          <p:cNvPr id="3" name="Content Placeholder 2">
+            <a:extLst>
+              <a:ext uri="{FF2B5EF4-FFF2-40B4-BE49-F238E27FC236}">
+                <a16:creationId xmlns:a16="http://schemas.microsoft.com/office/drawing/2014/main" id="{8FD20D94-A8A5-4E19-9EEA-AC7D02A3ED28}"/>
+              </a:ext>
+            </a:extLst>
+          </p:cNvPr>
+          <p:cNvSpPr>
+            <a:spLocks noGrp="1"/>
+          </p:cNvSpPr>
+          <p:nvPr>
+            <p:ph idx="1"/>
+          </p:nvPr>
+        </p:nvSpPr>
+        <p:spPr>
+          <a:xfrm>
+            <a:off x="803169" y="2303202"/>
+            <a:ext cx="8596668" cy="3880773"/>
+          </a:xfrm>
+        </p:spPr>
+        <p:txBody>
+          <a:bodyPr/>
+          <a:lstStyle/>
+          <a:p>
+            <a:pPr marL="0" indent="0">
+              <a:buNone/>
+            </a:pPr>
+            <a:endParaRPr lang="en-US" dirty="0"/>
+          </a:p>
+          <a:p>
+            <a:endParaRPr lang="en-US" dirty="0"/>
+          </a:p>
+        </p:txBody>
+      </p:sp>
+      <p:pic>
+        <p:nvPicPr>
+          <p:cNvPr id="6" name="Picture 5" descr="Diagram&#10;&#10;Description automatically generated">
+            <a:extLst>
+              <a:ext uri="{FF2B5EF4-FFF2-40B4-BE49-F238E27FC236}">
+                <a16:creationId xmlns:a16="http://schemas.microsoft.com/office/drawing/2014/main" id="{BE94A2A9-5C51-4928-9A4C-A3EB8ABF1789}"/>
+              </a:ext>
+            </a:extLst>
+          </p:cNvPr>
+          <p:cNvPicPr>
+            <a:picLocks noChangeAspect="1"/>
+          </p:cNvPicPr>
+          <p:nvPr/>
+        </p:nvPicPr>
+        <p:blipFill>
+          <a:blip r:embed="rId2">
+            <a:extLst>
+              <a:ext uri="{28A0092B-C50C-407E-A947-70E740481C1C}">
+                <a14:useLocalDpi xmlns:a14="http://schemas.microsoft.com/office/drawing/2010/main" val="0"/>
+              </a:ext>
+            </a:extLst>
+          </a:blip>
+          <a:stretch>
+            <a:fillRect/>
+          </a:stretch>
+        </p:blipFill>
+        <p:spPr>
+          <a:xfrm>
+            <a:off x="2244003" y="2303202"/>
+            <a:ext cx="5715000" cy="2857500"/>
+          </a:xfrm>
+          <a:prstGeom prst="rect">
+            <a:avLst/>
+          </a:prstGeom>
+        </p:spPr>
+      </p:pic>
+    </p:spTree>
+    <p:extLst>
+      <p:ext uri="{BB962C8B-B14F-4D97-AF65-F5344CB8AC3E}">
+        <p14:creationId xmlns:p14="http://schemas.microsoft.com/office/powerpoint/2010/main" val="1124589062"/>
+      </p:ext>
+    </p:extLst>
+  </p:cSld>
+  <p:clrMapOvr>
+    <a:masterClrMapping/>
+  </p:clrMapOvr>
+</p:sld>
+</file>
+
+<file path=ppt/slides/slide15.xml><?xml version="1.0" encoding="utf-8"?>
+<p:sld xmlns:a="http://schemas.openxmlformats.org/drawingml/2006/main" xmlns:r="http://schemas.openxmlformats.org/officeDocument/2006/relationships" xmlns:p="http://schemas.openxmlformats.org/presentationml/2006/main">
+  <p:cSld>
+    <p:spTree>
+      <p:nvGrpSpPr>
+        <p:cNvPr id="1" name=""/>
+        <p:cNvGrpSpPr/>
+        <p:nvPr/>
+      </p:nvGrpSpPr>
+      <p:grpSpPr>
+        <a:xfrm>
+          <a:off x="0" y="0"/>
+          <a:ext cx="0" cy="0"/>
+          <a:chOff x="0" y="0"/>
+          <a:chExt cx="0" cy="0"/>
+        </a:xfrm>
+      </p:grpSpPr>
+      <p:sp>
+        <p:nvSpPr>
+          <p:cNvPr id="2" name="Title 1">
+            <a:extLst>
+              <a:ext uri="{FF2B5EF4-FFF2-40B4-BE49-F238E27FC236}">
+                <a16:creationId xmlns:a16="http://schemas.microsoft.com/office/drawing/2014/main" id="{DCD84134-5E9E-4D7C-95CC-F3BC1CA1D5EC}"/>
+              </a:ext>
+            </a:extLst>
+          </p:cNvPr>
+          <p:cNvSpPr>
+            <a:spLocks noGrp="1"/>
+          </p:cNvSpPr>
+          <p:nvPr>
+            <p:ph type="title"/>
+          </p:nvPr>
+        </p:nvSpPr>
+        <p:spPr/>
+        <p:txBody>
+          <a:bodyPr/>
+          <a:lstStyle/>
+          <a:p>
+            <a:r>
+              <a:rPr lang="en-US" dirty="0"/>
+              <a:t>Command - </a:t>
+            </a:r>
+            <a:r>
+              <a:rPr lang="sk-SK" dirty="0"/>
+              <a:t>štruktúra</a:t>
+            </a:r>
+            <a:endParaRPr lang="en-US" dirty="0"/>
+          </a:p>
+        </p:txBody>
+      </p:sp>
+      <p:sp>
+        <p:nvSpPr>
+          <p:cNvPr id="3" name="Content Placeholder 2">
+            <a:extLst>
+              <a:ext uri="{FF2B5EF4-FFF2-40B4-BE49-F238E27FC236}">
+                <a16:creationId xmlns:a16="http://schemas.microsoft.com/office/drawing/2014/main" id="{8FD20D94-A8A5-4E19-9EEA-AC7D02A3ED28}"/>
+              </a:ext>
+            </a:extLst>
+          </p:cNvPr>
+          <p:cNvSpPr>
+            <a:spLocks noGrp="1"/>
+          </p:cNvSpPr>
+          <p:nvPr>
+            <p:ph idx="1"/>
+          </p:nvPr>
+        </p:nvSpPr>
+        <p:spPr>
+          <a:xfrm>
+            <a:off x="803169" y="2303202"/>
+            <a:ext cx="8596668" cy="3880773"/>
+          </a:xfrm>
+        </p:spPr>
+        <p:txBody>
+          <a:bodyPr/>
+          <a:lstStyle/>
+          <a:p>
+            <a:pPr marL="0" indent="0">
+              <a:buNone/>
+            </a:pPr>
+            <a:endParaRPr lang="en-US" dirty="0"/>
+          </a:p>
+          <a:p>
+            <a:endParaRPr lang="en-US" dirty="0"/>
+          </a:p>
+        </p:txBody>
+      </p:sp>
+      <p:pic>
+        <p:nvPicPr>
+          <p:cNvPr id="5" name="Picture 4" descr="Diagram&#10;&#10;Description automatically generated">
+            <a:extLst>
+              <a:ext uri="{FF2B5EF4-FFF2-40B4-BE49-F238E27FC236}">
+                <a16:creationId xmlns:a16="http://schemas.microsoft.com/office/drawing/2014/main" id="{4A0A03B4-E9FE-4998-86EB-FF3422259190}"/>
+              </a:ext>
+            </a:extLst>
+          </p:cNvPr>
+          <p:cNvPicPr>
+            <a:picLocks noChangeAspect="1"/>
+          </p:cNvPicPr>
+          <p:nvPr/>
+        </p:nvPicPr>
+        <p:blipFill>
+          <a:blip r:embed="rId2">
+            <a:extLst>
+              <a:ext uri="{28A0092B-C50C-407E-A947-70E740481C1C}">
+                <a14:useLocalDpi xmlns:a14="http://schemas.microsoft.com/office/drawing/2010/main" val="0"/>
+              </a:ext>
+            </a:extLst>
+          </a:blip>
+          <a:stretch>
+            <a:fillRect/>
+          </a:stretch>
+        </p:blipFill>
+        <p:spPr>
+          <a:xfrm>
+            <a:off x="2101128" y="1930400"/>
+            <a:ext cx="6000750" cy="3524250"/>
+          </a:xfrm>
+          <a:prstGeom prst="rect">
+            <a:avLst/>
+          </a:prstGeom>
+        </p:spPr>
+      </p:pic>
+    </p:spTree>
+    <p:extLst>
+      <p:ext uri="{BB962C8B-B14F-4D97-AF65-F5344CB8AC3E}">
+        <p14:creationId xmlns:p14="http://schemas.microsoft.com/office/powerpoint/2010/main" val="464244041"/>
+      </p:ext>
+    </p:extLst>
+  </p:cSld>
+  <p:clrMapOvr>
+    <a:masterClrMapping/>
+  </p:clrMapOvr>
+</p:sld>
+</file>
+
+<file path=ppt/slides/slide16.xml><?xml version="1.0" encoding="utf-8"?>
+<p:sld xmlns:a="http://schemas.openxmlformats.org/drawingml/2006/main" xmlns:r="http://schemas.openxmlformats.org/officeDocument/2006/relationships" xmlns:p="http://schemas.openxmlformats.org/presentationml/2006/main">
+  <p:cSld>
+    <p:spTree>
+      <p:nvGrpSpPr>
+        <p:cNvPr id="1" name=""/>
+        <p:cNvGrpSpPr/>
+        <p:nvPr/>
+      </p:nvGrpSpPr>
+      <p:grpSpPr>
+        <a:xfrm>
+          <a:off x="0" y="0"/>
+          <a:ext cx="0" cy="0"/>
+          <a:chOff x="0" y="0"/>
+          <a:chExt cx="0" cy="0"/>
+        </a:xfrm>
+      </p:grpSpPr>
+      <p:sp>
+        <p:nvSpPr>
+          <p:cNvPr id="2" name="Title 1">
+            <a:extLst>
+              <a:ext uri="{FF2B5EF4-FFF2-40B4-BE49-F238E27FC236}">
+                <a16:creationId xmlns:a16="http://schemas.microsoft.com/office/drawing/2014/main" id="{DCD84134-5E9E-4D7C-95CC-F3BC1CA1D5EC}"/>
+              </a:ext>
+            </a:extLst>
+          </p:cNvPr>
+          <p:cNvSpPr>
+            <a:spLocks noGrp="1"/>
+          </p:cNvSpPr>
+          <p:nvPr>
+            <p:ph type="title"/>
+          </p:nvPr>
+        </p:nvSpPr>
+        <p:spPr/>
+        <p:txBody>
+          <a:bodyPr/>
+          <a:lstStyle/>
+          <a:p>
+            <a:r>
+              <a:rPr lang="en-US" dirty="0"/>
+              <a:t>Interpreter</a:t>
+            </a:r>
+          </a:p>
+        </p:txBody>
+      </p:sp>
+      <p:sp>
+        <p:nvSpPr>
+          <p:cNvPr id="9" name="Content Placeholder 8">
+            <a:extLst>
+              <a:ext uri="{FF2B5EF4-FFF2-40B4-BE49-F238E27FC236}">
+                <a16:creationId xmlns:a16="http://schemas.microsoft.com/office/drawing/2014/main" id="{BC61987B-D497-4FD4-ADA6-A3766854C0D3}"/>
+              </a:ext>
+            </a:extLst>
+          </p:cNvPr>
+          <p:cNvSpPr>
+            <a:spLocks noGrp="1"/>
+          </p:cNvSpPr>
+          <p:nvPr>
+            <p:ph idx="1"/>
+          </p:nvPr>
+        </p:nvSpPr>
+        <p:spPr/>
+        <p:txBody>
+          <a:bodyPr/>
+          <a:lstStyle/>
+          <a:p>
+            <a:r>
+              <a:rPr lang="en-US" dirty="0" err="1"/>
+              <a:t>Reprezentácia</a:t>
+            </a:r>
+            <a:r>
+              <a:rPr lang="en-US" dirty="0"/>
+              <a:t> </a:t>
+            </a:r>
+            <a:r>
+              <a:rPr lang="en-US" dirty="0" err="1"/>
+              <a:t>gramatiky</a:t>
+            </a:r>
+            <a:r>
+              <a:rPr lang="en-US" dirty="0"/>
+              <a:t> </a:t>
+            </a:r>
+            <a:r>
+              <a:rPr lang="en-US" dirty="0" err="1"/>
+              <a:t>jazyka</a:t>
+            </a:r>
+            <a:r>
+              <a:rPr lang="en-US" dirty="0"/>
+              <a:t> </a:t>
+            </a:r>
+            <a:r>
+              <a:rPr lang="en-US" dirty="0" err="1"/>
+              <a:t>spolu</a:t>
+            </a:r>
+            <a:r>
+              <a:rPr lang="en-US" dirty="0"/>
+              <a:t> s </a:t>
+            </a:r>
+            <a:r>
+              <a:rPr lang="en-US" dirty="0" err="1"/>
+              <a:t>tlmočníkom</a:t>
+            </a:r>
+            <a:r>
+              <a:rPr lang="en-US" dirty="0"/>
+              <a:t>, </a:t>
+            </a:r>
+            <a:r>
+              <a:rPr lang="en-US" dirty="0" err="1"/>
+              <a:t>ktorý</a:t>
+            </a:r>
+            <a:r>
+              <a:rPr lang="en-US" dirty="0"/>
+              <a:t> </a:t>
+            </a:r>
+            <a:r>
+              <a:rPr lang="en-US" dirty="0" err="1"/>
+              <a:t>túto</a:t>
+            </a:r>
+            <a:r>
+              <a:rPr lang="en-US" dirty="0"/>
+              <a:t> </a:t>
+            </a:r>
+            <a:r>
+              <a:rPr lang="en-US" dirty="0" err="1"/>
+              <a:t>reprezentáciu</a:t>
+            </a:r>
+            <a:r>
+              <a:rPr lang="en-US" dirty="0"/>
+              <a:t> </a:t>
+            </a:r>
+            <a:r>
+              <a:rPr lang="en-US" dirty="0" err="1"/>
+              <a:t>používa</a:t>
+            </a:r>
+            <a:r>
+              <a:rPr lang="en-US" dirty="0"/>
+              <a:t> </a:t>
+            </a:r>
+            <a:r>
+              <a:rPr lang="en-US" dirty="0" err="1"/>
+              <a:t>na</a:t>
+            </a:r>
+            <a:r>
+              <a:rPr lang="en-US" dirty="0"/>
+              <a:t> </a:t>
+            </a:r>
+            <a:r>
+              <a:rPr lang="en-US" dirty="0" err="1"/>
+              <a:t>interpretáciu</a:t>
+            </a:r>
+            <a:r>
+              <a:rPr lang="en-US" dirty="0"/>
+              <a:t> </a:t>
+            </a:r>
+            <a:r>
+              <a:rPr lang="en-US" dirty="0" err="1"/>
+              <a:t>viet</a:t>
+            </a:r>
+            <a:r>
+              <a:rPr lang="en-US" dirty="0"/>
+              <a:t> v </a:t>
+            </a:r>
+            <a:r>
+              <a:rPr lang="en-US" dirty="0" err="1"/>
+              <a:t>jazyku</a:t>
+            </a:r>
+            <a:endParaRPr lang="en-US" dirty="0"/>
+          </a:p>
+          <a:p>
+            <a:r>
+              <a:rPr lang="en-US" dirty="0" err="1"/>
+              <a:t>Limitovaná</a:t>
+            </a:r>
+            <a:r>
+              <a:rPr lang="en-US" dirty="0"/>
+              <a:t> </a:t>
+            </a:r>
+            <a:r>
+              <a:rPr lang="en-US" dirty="0" err="1"/>
+              <a:t>oblasť</a:t>
+            </a:r>
+            <a:r>
+              <a:rPr lang="en-US" dirty="0"/>
+              <a:t> </a:t>
+            </a:r>
+            <a:r>
+              <a:rPr lang="en-US" dirty="0" err="1"/>
+              <a:t>využitia</a:t>
+            </a:r>
+            <a:endParaRPr lang="en-US" dirty="0"/>
+          </a:p>
+          <a:p>
+            <a:endParaRPr lang="en-US" dirty="0"/>
+          </a:p>
+          <a:p>
+            <a:endParaRPr lang="en-US" dirty="0"/>
+          </a:p>
+        </p:txBody>
+      </p:sp>
+    </p:spTree>
+    <p:extLst>
+      <p:ext uri="{BB962C8B-B14F-4D97-AF65-F5344CB8AC3E}">
+        <p14:creationId xmlns:p14="http://schemas.microsoft.com/office/powerpoint/2010/main" val="1467439837"/>
+      </p:ext>
+    </p:extLst>
+  </p:cSld>
+  <p:clrMapOvr>
+    <a:masterClrMapping/>
+  </p:clrMapOvr>
+</p:sld>
+</file>
+
+<file path=ppt/slides/slide17.xml><?xml version="1.0" encoding="utf-8"?>
+<p:sld xmlns:a="http://schemas.openxmlformats.org/drawingml/2006/main" xmlns:r="http://schemas.openxmlformats.org/officeDocument/2006/relationships" xmlns:p="http://schemas.openxmlformats.org/presentationml/2006/main">
+  <p:cSld>
+    <p:spTree>
+      <p:nvGrpSpPr>
+        <p:cNvPr id="1" name=""/>
+        <p:cNvGrpSpPr/>
+        <p:nvPr/>
+      </p:nvGrpSpPr>
+      <p:grpSpPr>
+        <a:xfrm>
+          <a:off x="0" y="0"/>
+          <a:ext cx="0" cy="0"/>
+          <a:chOff x="0" y="0"/>
+          <a:chExt cx="0" cy="0"/>
+        </a:xfrm>
+      </p:grpSpPr>
+      <p:sp>
+        <p:nvSpPr>
+          <p:cNvPr id="2" name="Title 1">
+            <a:extLst>
+              <a:ext uri="{FF2B5EF4-FFF2-40B4-BE49-F238E27FC236}">
+                <a16:creationId xmlns:a16="http://schemas.microsoft.com/office/drawing/2014/main" id="{DCD84134-5E9E-4D7C-95CC-F3BC1CA1D5EC}"/>
+              </a:ext>
+            </a:extLst>
+          </p:cNvPr>
+          <p:cNvSpPr>
+            <a:spLocks noGrp="1"/>
+          </p:cNvSpPr>
+          <p:nvPr>
+            <p:ph type="title"/>
+          </p:nvPr>
+        </p:nvSpPr>
+        <p:spPr/>
+        <p:txBody>
+          <a:bodyPr/>
+          <a:lstStyle/>
+          <a:p>
+            <a:r>
+              <a:rPr lang="en-US" dirty="0"/>
+              <a:t>Iterator</a:t>
+            </a:r>
+          </a:p>
+        </p:txBody>
+      </p:sp>
+      <p:sp>
+        <p:nvSpPr>
+          <p:cNvPr id="9" name="Content Placeholder 8">
+            <a:extLst>
+              <a:ext uri="{FF2B5EF4-FFF2-40B4-BE49-F238E27FC236}">
+                <a16:creationId xmlns:a16="http://schemas.microsoft.com/office/drawing/2014/main" id="{BC61987B-D497-4FD4-ADA6-A3766854C0D3}"/>
+              </a:ext>
+            </a:extLst>
+          </p:cNvPr>
+          <p:cNvSpPr>
+            <a:spLocks noGrp="1"/>
+          </p:cNvSpPr>
+          <p:nvPr>
+            <p:ph idx="1"/>
+          </p:nvPr>
+        </p:nvSpPr>
+        <p:spPr/>
+        <p:txBody>
+          <a:bodyPr/>
+          <a:lstStyle/>
+          <a:p>
+            <a:r>
+              <a:rPr lang="en-US" dirty="0" err="1"/>
+              <a:t>Umožnuje</a:t>
+            </a:r>
+            <a:r>
+              <a:rPr lang="en-US" dirty="0"/>
+              <a:t> </a:t>
+            </a:r>
+            <a:r>
+              <a:rPr lang="en-US" dirty="0" err="1"/>
+              <a:t>sekvenčné</a:t>
+            </a:r>
+            <a:r>
+              <a:rPr lang="en-US" dirty="0"/>
+              <a:t> </a:t>
+            </a:r>
+            <a:r>
+              <a:rPr lang="en-US" dirty="0" err="1"/>
+              <a:t>prehľadávanie</a:t>
+            </a:r>
+            <a:r>
+              <a:rPr lang="en-US" dirty="0"/>
+              <a:t> </a:t>
+            </a:r>
+            <a:r>
+              <a:rPr lang="en-US" dirty="0" err="1"/>
+              <a:t>prvkov</a:t>
+            </a:r>
+            <a:r>
+              <a:rPr lang="en-US" dirty="0"/>
+              <a:t> bez </a:t>
+            </a:r>
+            <a:r>
+              <a:rPr lang="en-US" dirty="0" err="1"/>
+              <a:t>sprístupnenia</a:t>
+            </a:r>
+            <a:r>
+              <a:rPr lang="en-US" dirty="0"/>
+              <a:t> </a:t>
+            </a:r>
+            <a:r>
+              <a:rPr lang="en-US" dirty="0" err="1"/>
+              <a:t>kolekcie</a:t>
+            </a:r>
+            <a:endParaRPr lang="en-US" dirty="0"/>
+          </a:p>
+          <a:p>
+            <a:endParaRPr lang="en-US" dirty="0"/>
+          </a:p>
+        </p:txBody>
+      </p:sp>
+      <p:pic>
+        <p:nvPicPr>
+          <p:cNvPr id="4" name="Picture 3" descr="A picture containing text&#10;&#10;Description automatically generated">
+            <a:extLst>
+              <a:ext uri="{FF2B5EF4-FFF2-40B4-BE49-F238E27FC236}">
+                <a16:creationId xmlns:a16="http://schemas.microsoft.com/office/drawing/2014/main" id="{DCB997B6-208F-4316-B53B-E2683CD9640E}"/>
+              </a:ext>
+            </a:extLst>
+          </p:cNvPr>
+          <p:cNvPicPr>
+            <a:picLocks noChangeAspect="1"/>
+          </p:cNvPicPr>
+          <p:nvPr/>
+        </p:nvPicPr>
+        <p:blipFill>
+          <a:blip r:embed="rId2">
+            <a:extLst>
+              <a:ext uri="{28A0092B-C50C-407E-A947-70E740481C1C}">
+                <a14:useLocalDpi xmlns:a14="http://schemas.microsoft.com/office/drawing/2010/main" val="0"/>
+              </a:ext>
+            </a:extLst>
+          </a:blip>
+          <a:stretch>
+            <a:fillRect/>
+          </a:stretch>
+        </p:blipFill>
+        <p:spPr>
+          <a:xfrm>
+            <a:off x="2609850" y="2651389"/>
+            <a:ext cx="4685155" cy="2928222"/>
+          </a:xfrm>
+          <a:prstGeom prst="rect">
+            <a:avLst/>
+          </a:prstGeom>
+        </p:spPr>
+      </p:pic>
+    </p:spTree>
+    <p:extLst>
+      <p:ext uri="{BB962C8B-B14F-4D97-AF65-F5344CB8AC3E}">
+        <p14:creationId xmlns:p14="http://schemas.microsoft.com/office/powerpoint/2010/main" val="1636327240"/>
+      </p:ext>
+    </p:extLst>
+  </p:cSld>
+  <p:clrMapOvr>
+    <a:masterClrMapping/>
+  </p:clrMapOvr>
+</p:sld>
+</file>
+
+<file path=ppt/slides/slide18.xml><?xml version="1.0" encoding="utf-8"?>
+<p:sld xmlns:a="http://schemas.openxmlformats.org/drawingml/2006/main" xmlns:r="http://schemas.openxmlformats.org/officeDocument/2006/relationships" xmlns:p="http://schemas.openxmlformats.org/presentationml/2006/main">
+  <p:cSld>
+    <p:spTree>
+      <p:nvGrpSpPr>
+        <p:cNvPr id="1" name=""/>
+        <p:cNvGrpSpPr/>
+        <p:nvPr/>
+      </p:nvGrpSpPr>
+      <p:grpSpPr>
+        <a:xfrm>
+          <a:off x="0" y="0"/>
+          <a:ext cx="0" cy="0"/>
+          <a:chOff x="0" y="0"/>
+          <a:chExt cx="0" cy="0"/>
+        </a:xfrm>
+      </p:grpSpPr>
+      <p:sp>
+        <p:nvSpPr>
+          <p:cNvPr id="2" name="Title 1">
+            <a:extLst>
+              <a:ext uri="{FF2B5EF4-FFF2-40B4-BE49-F238E27FC236}">
+                <a16:creationId xmlns:a16="http://schemas.microsoft.com/office/drawing/2014/main" id="{DCD84134-5E9E-4D7C-95CC-F3BC1CA1D5EC}"/>
+              </a:ext>
+            </a:extLst>
+          </p:cNvPr>
+          <p:cNvSpPr>
+            <a:spLocks noGrp="1"/>
+          </p:cNvSpPr>
+          <p:nvPr>
+            <p:ph type="title"/>
+          </p:nvPr>
+        </p:nvSpPr>
+        <p:spPr/>
+        <p:txBody>
+          <a:bodyPr/>
+          <a:lstStyle/>
+          <a:p>
+            <a:r>
+              <a:rPr lang="en-US" dirty="0"/>
+              <a:t>Iterator - </a:t>
+            </a:r>
+            <a:r>
+              <a:rPr lang="en-US" dirty="0" err="1"/>
+              <a:t>problém</a:t>
+            </a:r>
+            <a:endParaRPr lang="en-US" dirty="0"/>
+          </a:p>
+        </p:txBody>
+      </p:sp>
+      <p:sp>
+        <p:nvSpPr>
+          <p:cNvPr id="9" name="Content Placeholder 8">
+            <a:extLst>
+              <a:ext uri="{FF2B5EF4-FFF2-40B4-BE49-F238E27FC236}">
+                <a16:creationId xmlns:a16="http://schemas.microsoft.com/office/drawing/2014/main" id="{BC61987B-D497-4FD4-ADA6-A3766854C0D3}"/>
+              </a:ext>
+            </a:extLst>
+          </p:cNvPr>
+          <p:cNvSpPr>
+            <a:spLocks noGrp="1"/>
+          </p:cNvSpPr>
+          <p:nvPr>
+            <p:ph idx="1"/>
+          </p:nvPr>
+        </p:nvSpPr>
+        <p:spPr>
+          <a:xfrm>
+            <a:off x="677334" y="2179639"/>
+            <a:ext cx="8596668" cy="3880773"/>
+          </a:xfrm>
+        </p:spPr>
+        <p:txBody>
+          <a:bodyPr/>
+          <a:lstStyle/>
+          <a:p>
+            <a:r>
+              <a:rPr lang="en-US" dirty="0" err="1"/>
+              <a:t>Komplexná</a:t>
+            </a:r>
+            <a:r>
+              <a:rPr lang="en-US" dirty="0"/>
+              <a:t> </a:t>
+            </a:r>
+            <a:r>
+              <a:rPr lang="en-US" dirty="0" err="1"/>
+              <a:t>dátová</a:t>
+            </a:r>
+            <a:r>
+              <a:rPr lang="en-US" dirty="0"/>
+              <a:t> </a:t>
+            </a:r>
+            <a:r>
+              <a:rPr lang="en-US" dirty="0" err="1"/>
+              <a:t>štruktúra</a:t>
+            </a:r>
+            <a:endParaRPr lang="en-US" dirty="0"/>
+          </a:p>
+          <a:p>
+            <a:r>
+              <a:rPr lang="en-US" dirty="0" err="1"/>
+              <a:t>Viaceré</a:t>
+            </a:r>
+            <a:r>
+              <a:rPr lang="en-US" dirty="0"/>
+              <a:t> </a:t>
+            </a:r>
+            <a:r>
+              <a:rPr lang="en-US" dirty="0" err="1"/>
+              <a:t>spôsoby</a:t>
+            </a:r>
+            <a:r>
+              <a:rPr lang="en-US" dirty="0"/>
+              <a:t> </a:t>
+            </a:r>
+            <a:r>
+              <a:rPr lang="en-US" dirty="0" err="1"/>
+              <a:t>prehľadávania</a:t>
+            </a:r>
+            <a:endParaRPr lang="en-US" dirty="0"/>
+          </a:p>
+          <a:p>
+            <a:endParaRPr lang="en-US" dirty="0"/>
+          </a:p>
+        </p:txBody>
+      </p:sp>
+      <p:pic>
+        <p:nvPicPr>
+          <p:cNvPr id="5" name="Picture 4" descr="A picture containing icon&#10;&#10;Description automatically generated">
+            <a:extLst>
+              <a:ext uri="{FF2B5EF4-FFF2-40B4-BE49-F238E27FC236}">
+                <a16:creationId xmlns:a16="http://schemas.microsoft.com/office/drawing/2014/main" id="{ECE99C56-D4DC-48E4-960B-FC145A0B75DB}"/>
+              </a:ext>
+            </a:extLst>
+          </p:cNvPr>
+          <p:cNvPicPr>
+            <a:picLocks noChangeAspect="1"/>
+          </p:cNvPicPr>
+          <p:nvPr/>
+        </p:nvPicPr>
+        <p:blipFill>
+          <a:blip r:embed="rId2">
+            <a:extLst>
+              <a:ext uri="{28A0092B-C50C-407E-A947-70E740481C1C}">
+                <a14:useLocalDpi xmlns:a14="http://schemas.microsoft.com/office/drawing/2010/main" val="0"/>
+              </a:ext>
+            </a:extLst>
+          </a:blip>
+          <a:stretch>
+            <a:fillRect/>
+          </a:stretch>
+        </p:blipFill>
+        <p:spPr>
+          <a:xfrm>
+            <a:off x="1913652" y="3303487"/>
+            <a:ext cx="6124031" cy="1633075"/>
+          </a:xfrm>
+          <a:prstGeom prst="rect">
+            <a:avLst/>
+          </a:prstGeom>
+        </p:spPr>
+      </p:pic>
+    </p:spTree>
+    <p:extLst>
+      <p:ext uri="{BB962C8B-B14F-4D97-AF65-F5344CB8AC3E}">
+        <p14:creationId xmlns:p14="http://schemas.microsoft.com/office/powerpoint/2010/main" val="3907310690"/>
+      </p:ext>
+    </p:extLst>
+  </p:cSld>
+  <p:clrMapOvr>
+    <a:masterClrMapping/>
+  </p:clrMapOvr>
+</p:sld>
+</file>
+
+<file path=ppt/slides/slide19.xml><?xml version="1.0" encoding="utf-8"?>
+<p:sld xmlns:a="http://schemas.openxmlformats.org/drawingml/2006/main" xmlns:r="http://schemas.openxmlformats.org/officeDocument/2006/relationships" xmlns:p="http://schemas.openxmlformats.org/presentationml/2006/main">
+  <p:cSld>
+    <p:spTree>
+      <p:nvGrpSpPr>
+        <p:cNvPr id="1" name=""/>
+        <p:cNvGrpSpPr/>
+        <p:nvPr/>
+      </p:nvGrpSpPr>
+      <p:grpSpPr>
+        <a:xfrm>
+          <a:off x="0" y="0"/>
+          <a:ext cx="0" cy="0"/>
+          <a:chOff x="0" y="0"/>
+          <a:chExt cx="0" cy="0"/>
+        </a:xfrm>
+      </p:grpSpPr>
+      <p:sp>
+        <p:nvSpPr>
+          <p:cNvPr id="2" name="Title 1">
+            <a:extLst>
+              <a:ext uri="{FF2B5EF4-FFF2-40B4-BE49-F238E27FC236}">
+                <a16:creationId xmlns:a16="http://schemas.microsoft.com/office/drawing/2014/main" id="{DCD84134-5E9E-4D7C-95CC-F3BC1CA1D5EC}"/>
+              </a:ext>
+            </a:extLst>
+          </p:cNvPr>
+          <p:cNvSpPr>
+            <a:spLocks noGrp="1"/>
+          </p:cNvSpPr>
+          <p:nvPr>
+            <p:ph type="title"/>
+          </p:nvPr>
+        </p:nvSpPr>
+        <p:spPr/>
+        <p:txBody>
+          <a:bodyPr/>
+          <a:lstStyle/>
+          <a:p>
+            <a:r>
+              <a:rPr lang="en-US" dirty="0"/>
+              <a:t>Iterator - </a:t>
+            </a:r>
+            <a:r>
+              <a:rPr lang="en-US" dirty="0" err="1"/>
+              <a:t>riešenie</a:t>
+            </a:r>
+            <a:endParaRPr lang="en-US" dirty="0"/>
+          </a:p>
+        </p:txBody>
+      </p:sp>
+      <p:sp>
+        <p:nvSpPr>
+          <p:cNvPr id="9" name="Content Placeholder 8">
+            <a:extLst>
+              <a:ext uri="{FF2B5EF4-FFF2-40B4-BE49-F238E27FC236}">
+                <a16:creationId xmlns:a16="http://schemas.microsoft.com/office/drawing/2014/main" id="{BC61987B-D497-4FD4-ADA6-A3766854C0D3}"/>
+              </a:ext>
+            </a:extLst>
+          </p:cNvPr>
+          <p:cNvSpPr>
+            <a:spLocks noGrp="1"/>
+          </p:cNvSpPr>
+          <p:nvPr>
+            <p:ph idx="1"/>
+          </p:nvPr>
+        </p:nvSpPr>
+        <p:spPr>
+          <a:xfrm>
+            <a:off x="677334" y="1665289"/>
+            <a:ext cx="8596668" cy="3880773"/>
+          </a:xfrm>
+        </p:spPr>
+        <p:txBody>
+          <a:bodyPr/>
+          <a:lstStyle/>
+          <a:p>
+            <a:r>
+              <a:rPr lang="en-US" dirty="0" err="1"/>
+              <a:t>Extrakcia</a:t>
+            </a:r>
+            <a:r>
+              <a:rPr lang="en-US" dirty="0"/>
+              <a:t> </a:t>
+            </a:r>
+            <a:r>
+              <a:rPr lang="en-US" dirty="0" err="1"/>
+              <a:t>prehľadávania</a:t>
+            </a:r>
+            <a:r>
+              <a:rPr lang="en-US" dirty="0"/>
+              <a:t> </a:t>
+            </a:r>
+            <a:r>
+              <a:rPr lang="en-US" dirty="0" err="1"/>
+              <a:t>kolekcie</a:t>
+            </a:r>
+            <a:r>
+              <a:rPr lang="en-US" dirty="0"/>
+              <a:t> do </a:t>
+            </a:r>
+            <a:r>
+              <a:rPr lang="en-US" dirty="0" err="1"/>
+              <a:t>objektu</a:t>
+            </a:r>
+            <a:r>
+              <a:rPr lang="en-US" dirty="0"/>
+              <a:t> (</a:t>
+            </a:r>
+            <a:r>
+              <a:rPr lang="en-US" dirty="0" err="1"/>
+              <a:t>iterátora</a:t>
+            </a:r>
+            <a:r>
+              <a:rPr lang="en-US" dirty="0"/>
+              <a:t>)</a:t>
+            </a:r>
+          </a:p>
+          <a:p>
+            <a:pPr marL="0" indent="0">
+              <a:buNone/>
+            </a:pPr>
+            <a:endParaRPr lang="en-US" dirty="0"/>
+          </a:p>
+          <a:p>
+            <a:endParaRPr lang="en-US" dirty="0"/>
+          </a:p>
+        </p:txBody>
+      </p:sp>
+      <p:pic>
+        <p:nvPicPr>
+          <p:cNvPr id="4" name="Picture 3" descr="Diagram&#10;&#10;Description automatically generated with medium confidence">
+            <a:extLst>
+              <a:ext uri="{FF2B5EF4-FFF2-40B4-BE49-F238E27FC236}">
+                <a16:creationId xmlns:a16="http://schemas.microsoft.com/office/drawing/2014/main" id="{A3CA4ADE-29CD-4C7E-90AE-4AE49367C6BE}"/>
+              </a:ext>
+            </a:extLst>
+          </p:cNvPr>
+          <p:cNvPicPr>
+            <a:picLocks noChangeAspect="1"/>
+          </p:cNvPicPr>
+          <p:nvPr/>
+        </p:nvPicPr>
+        <p:blipFill>
+          <a:blip r:embed="rId2">
+            <a:extLst>
+              <a:ext uri="{28A0092B-C50C-407E-A947-70E740481C1C}">
+                <a14:useLocalDpi xmlns:a14="http://schemas.microsoft.com/office/drawing/2010/main" val="0"/>
+              </a:ext>
+            </a:extLst>
+          </a:blip>
+          <a:stretch>
+            <a:fillRect/>
+          </a:stretch>
+        </p:blipFill>
+        <p:spPr>
+          <a:xfrm>
+            <a:off x="3306072" y="2206625"/>
+            <a:ext cx="3339192" cy="3923550"/>
+          </a:xfrm>
+          <a:prstGeom prst="rect">
+            <a:avLst/>
+          </a:prstGeom>
+        </p:spPr>
+      </p:pic>
+    </p:spTree>
+    <p:extLst>
+      <p:ext uri="{BB962C8B-B14F-4D97-AF65-F5344CB8AC3E}">
+        <p14:creationId xmlns:p14="http://schemas.microsoft.com/office/powerpoint/2010/main" val="2784331936"/>
+      </p:ext>
+    </p:extLst>
+  </p:cSld>
+  <p:clrMapOvr>
+    <a:masterClrMapping/>
+  </p:clrMapOvr>
+</p:sld>
+</file>
+
 <file path=ppt/slides/slide2.xml><?xml version="1.0" encoding="utf-8"?>
 <p:sld xmlns:a="http://schemas.openxmlformats.org/drawingml/2006/main" xmlns:r="http://schemas.openxmlformats.org/officeDocument/2006/relationships" xmlns:p="http://schemas.openxmlformats.org/presentationml/2006/main">
   <p:cSld>
@@ -5953,6 +7693,628 @@
       </p:grpSpPr>
       <p:sp>
         <p:nvSpPr>
+          <p:cNvPr id="2" name="Title 1">
+            <a:extLst>
+              <a:ext uri="{FF2B5EF4-FFF2-40B4-BE49-F238E27FC236}">
+                <a16:creationId xmlns:a16="http://schemas.microsoft.com/office/drawing/2014/main" id="{A01D8AAE-336F-4908-A7C8-4921CC071189}"/>
+              </a:ext>
+            </a:extLst>
+          </p:cNvPr>
+          <p:cNvSpPr>
+            <a:spLocks noGrp="1"/>
+          </p:cNvSpPr>
+          <p:nvPr>
+            <p:ph type="title"/>
+          </p:nvPr>
+        </p:nvSpPr>
+        <p:spPr/>
+        <p:txBody>
+          <a:bodyPr/>
+          <a:lstStyle/>
+          <a:p>
+            <a:r>
+              <a:rPr lang="en-US" dirty="0" err="1"/>
+              <a:t>Návrhový</a:t>
+            </a:r>
+            <a:r>
+              <a:rPr lang="en-US" dirty="0"/>
+              <a:t> </a:t>
+            </a:r>
+            <a:r>
+              <a:rPr lang="en-US" dirty="0" err="1"/>
+              <a:t>vzor</a:t>
+            </a:r>
+            <a:endParaRPr lang="en-US" dirty="0"/>
+          </a:p>
+        </p:txBody>
+      </p:sp>
+      <p:sp>
+        <p:nvSpPr>
+          <p:cNvPr id="3" name="Content Placeholder 2">
+            <a:extLst>
+              <a:ext uri="{FF2B5EF4-FFF2-40B4-BE49-F238E27FC236}">
+                <a16:creationId xmlns:a16="http://schemas.microsoft.com/office/drawing/2014/main" id="{079F5400-8DBD-46ED-9F6D-EEEC122BE1C2}"/>
+              </a:ext>
+            </a:extLst>
+          </p:cNvPr>
+          <p:cNvSpPr>
+            <a:spLocks noGrp="1"/>
+          </p:cNvSpPr>
+          <p:nvPr>
+            <p:ph idx="1"/>
+          </p:nvPr>
+        </p:nvSpPr>
+        <p:spPr/>
+        <p:txBody>
+          <a:bodyPr/>
+          <a:lstStyle/>
+          <a:p>
+            <a:r>
+              <a:rPr lang="en-US" dirty="0" err="1"/>
+              <a:t>Šablóna</a:t>
+            </a:r>
+            <a:r>
+              <a:rPr lang="en-US" dirty="0"/>
+              <a:t> </a:t>
+            </a:r>
+            <a:r>
+              <a:rPr lang="en-US" dirty="0" err="1"/>
+              <a:t>ktorú</a:t>
+            </a:r>
+            <a:r>
+              <a:rPr lang="en-US" dirty="0"/>
+              <a:t> je </a:t>
+            </a:r>
+            <a:r>
+              <a:rPr lang="en-US" dirty="0" err="1"/>
+              <a:t>možné</a:t>
+            </a:r>
+            <a:r>
+              <a:rPr lang="en-US" dirty="0"/>
+              <a:t> </a:t>
+            </a:r>
+            <a:r>
+              <a:rPr lang="en-US" dirty="0" err="1"/>
+              <a:t>použiť</a:t>
+            </a:r>
+            <a:r>
+              <a:rPr lang="en-US" dirty="0"/>
+              <a:t> v </a:t>
+            </a:r>
+            <a:r>
+              <a:rPr lang="en-US" dirty="0" err="1"/>
+              <a:t>rôznych</a:t>
+            </a:r>
+            <a:r>
+              <a:rPr lang="en-US" dirty="0"/>
+              <a:t> </a:t>
+            </a:r>
+            <a:r>
+              <a:rPr lang="en-US" dirty="0" err="1"/>
+              <a:t>situáciach</a:t>
+            </a:r>
+            <a:endParaRPr lang="en-US" dirty="0"/>
+          </a:p>
+          <a:p>
+            <a:r>
+              <a:rPr lang="en-US" dirty="0" err="1"/>
+              <a:t>Zrýchluje</a:t>
+            </a:r>
+            <a:r>
+              <a:rPr lang="en-US" dirty="0"/>
+              <a:t> </a:t>
+            </a:r>
+            <a:r>
+              <a:rPr lang="en-US" dirty="0" err="1"/>
+              <a:t>proces</a:t>
+            </a:r>
+            <a:r>
+              <a:rPr lang="en-US" dirty="0"/>
+              <a:t> </a:t>
+            </a:r>
+            <a:r>
+              <a:rPr lang="en-US" dirty="0" err="1"/>
+              <a:t>vývoja</a:t>
+            </a:r>
+            <a:r>
+              <a:rPr lang="en-US" dirty="0"/>
+              <a:t> </a:t>
+            </a:r>
+            <a:r>
+              <a:rPr lang="en-US" dirty="0" err="1"/>
+              <a:t>aplikácie</a:t>
+            </a:r>
+            <a:endParaRPr lang="en-US" dirty="0"/>
+          </a:p>
+          <a:p>
+            <a:r>
+              <a:rPr lang="en-US" dirty="0" err="1"/>
+              <a:t>Poskytuje</a:t>
+            </a:r>
+            <a:r>
+              <a:rPr lang="en-US" dirty="0"/>
+              <a:t> </a:t>
+            </a:r>
+            <a:r>
+              <a:rPr lang="en-US" dirty="0" err="1"/>
+              <a:t>overené</a:t>
+            </a:r>
+            <a:r>
+              <a:rPr lang="en-US" dirty="0"/>
+              <a:t> </a:t>
+            </a:r>
+            <a:r>
+              <a:rPr lang="en-US" dirty="0" err="1"/>
+              <a:t>riešenia</a:t>
+            </a:r>
+            <a:endParaRPr lang="en-US" dirty="0"/>
+          </a:p>
+          <a:p>
+            <a:r>
+              <a:rPr lang="en-US" dirty="0" err="1"/>
+              <a:t>Základné</a:t>
+            </a:r>
+            <a:r>
+              <a:rPr lang="en-US" dirty="0"/>
+              <a:t> </a:t>
+            </a:r>
+            <a:r>
+              <a:rPr lang="en-US" dirty="0" err="1"/>
+              <a:t>typy</a:t>
+            </a:r>
+            <a:r>
+              <a:rPr lang="en-US" dirty="0"/>
+              <a:t>:</a:t>
+            </a:r>
+          </a:p>
+          <a:p>
+            <a:pPr lvl="1"/>
+            <a:r>
+              <a:rPr lang="en-US" dirty="0"/>
+              <a:t>Creational Patterns</a:t>
+            </a:r>
+          </a:p>
+          <a:p>
+            <a:pPr lvl="1"/>
+            <a:r>
+              <a:rPr lang="en-US" dirty="0"/>
+              <a:t>Structural Patterns </a:t>
+            </a:r>
+          </a:p>
+          <a:p>
+            <a:pPr lvl="1"/>
+            <a:r>
+              <a:rPr lang="en-US" dirty="0"/>
+              <a:t>Behavioral Patterns</a:t>
+            </a:r>
+          </a:p>
+        </p:txBody>
+      </p:sp>
+    </p:spTree>
+    <p:extLst>
+      <p:ext uri="{BB962C8B-B14F-4D97-AF65-F5344CB8AC3E}">
+        <p14:creationId xmlns:p14="http://schemas.microsoft.com/office/powerpoint/2010/main" val="3152537057"/>
+      </p:ext>
+    </p:extLst>
+  </p:cSld>
+  <p:clrMapOvr>
+    <a:masterClrMapping/>
+  </p:clrMapOvr>
+</p:sld>
+</file>
+
+<file path=ppt/slides/slide20.xml><?xml version="1.0" encoding="utf-8"?>
+<p:sld xmlns:a="http://schemas.openxmlformats.org/drawingml/2006/main" xmlns:r="http://schemas.openxmlformats.org/officeDocument/2006/relationships" xmlns:p="http://schemas.openxmlformats.org/presentationml/2006/main">
+  <p:cSld>
+    <p:spTree>
+      <p:nvGrpSpPr>
+        <p:cNvPr id="1" name=""/>
+        <p:cNvGrpSpPr/>
+        <p:nvPr/>
+      </p:nvGrpSpPr>
+      <p:grpSpPr>
+        <a:xfrm>
+          <a:off x="0" y="0"/>
+          <a:ext cx="0" cy="0"/>
+          <a:chOff x="0" y="0"/>
+          <a:chExt cx="0" cy="0"/>
+        </a:xfrm>
+      </p:grpSpPr>
+      <p:sp>
+        <p:nvSpPr>
+          <p:cNvPr id="2" name="Title 1">
+            <a:extLst>
+              <a:ext uri="{FF2B5EF4-FFF2-40B4-BE49-F238E27FC236}">
+                <a16:creationId xmlns:a16="http://schemas.microsoft.com/office/drawing/2014/main" id="{DCD84134-5E9E-4D7C-95CC-F3BC1CA1D5EC}"/>
+              </a:ext>
+            </a:extLst>
+          </p:cNvPr>
+          <p:cNvSpPr>
+            <a:spLocks noGrp="1"/>
+          </p:cNvSpPr>
+          <p:nvPr>
+            <p:ph type="title"/>
+          </p:nvPr>
+        </p:nvSpPr>
+        <p:spPr/>
+        <p:txBody>
+          <a:bodyPr/>
+          <a:lstStyle/>
+          <a:p>
+            <a:r>
+              <a:rPr lang="en-US" dirty="0"/>
+              <a:t>Iterator - </a:t>
+            </a:r>
+            <a:r>
+              <a:rPr lang="sk-SK" dirty="0"/>
+              <a:t>príklad z reálneho sveta</a:t>
+            </a:r>
+            <a:endParaRPr lang="en-US" dirty="0"/>
+          </a:p>
+        </p:txBody>
+      </p:sp>
+      <p:pic>
+        <p:nvPicPr>
+          <p:cNvPr id="4" name="Content Placeholder 3" descr="A picture containing text&#10;&#10;Description automatically generated">
+            <a:extLst>
+              <a:ext uri="{FF2B5EF4-FFF2-40B4-BE49-F238E27FC236}">
+                <a16:creationId xmlns:a16="http://schemas.microsoft.com/office/drawing/2014/main" id="{9198997C-20B9-44B7-A541-A5EBC11E1E40}"/>
+              </a:ext>
+            </a:extLst>
+          </p:cNvPr>
+          <p:cNvPicPr>
+            <a:picLocks noGrp="1" noChangeAspect="1"/>
+          </p:cNvPicPr>
+          <p:nvPr>
+            <p:ph idx="1"/>
+          </p:nvPr>
+        </p:nvPicPr>
+        <p:blipFill>
+          <a:blip r:embed="rId2">
+            <a:extLst>
+              <a:ext uri="{28A0092B-C50C-407E-A947-70E740481C1C}">
+                <a14:useLocalDpi xmlns:a14="http://schemas.microsoft.com/office/drawing/2010/main" val="0"/>
+              </a:ext>
+            </a:extLst>
+          </a:blip>
+          <a:stretch>
+            <a:fillRect/>
+          </a:stretch>
+        </p:blipFill>
+        <p:spPr>
+          <a:xfrm>
+            <a:off x="1749021" y="1930400"/>
+            <a:ext cx="6453293" cy="3024981"/>
+          </a:xfrm>
+        </p:spPr>
+      </p:pic>
+    </p:spTree>
+    <p:extLst>
+      <p:ext uri="{BB962C8B-B14F-4D97-AF65-F5344CB8AC3E}">
+        <p14:creationId xmlns:p14="http://schemas.microsoft.com/office/powerpoint/2010/main" val="3928641898"/>
+      </p:ext>
+    </p:extLst>
+  </p:cSld>
+  <p:clrMapOvr>
+    <a:masterClrMapping/>
+  </p:clrMapOvr>
+</p:sld>
+</file>
+
+<file path=ppt/slides/slide21.xml><?xml version="1.0" encoding="utf-8"?>
+<p:sld xmlns:a="http://schemas.openxmlformats.org/drawingml/2006/main" xmlns:r="http://schemas.openxmlformats.org/officeDocument/2006/relationships" xmlns:p="http://schemas.openxmlformats.org/presentationml/2006/main">
+  <p:cSld>
+    <p:spTree>
+      <p:nvGrpSpPr>
+        <p:cNvPr id="1" name=""/>
+        <p:cNvGrpSpPr/>
+        <p:nvPr/>
+      </p:nvGrpSpPr>
+      <p:grpSpPr>
+        <a:xfrm>
+          <a:off x="0" y="0"/>
+          <a:ext cx="0" cy="0"/>
+          <a:chOff x="0" y="0"/>
+          <a:chExt cx="0" cy="0"/>
+        </a:xfrm>
+      </p:grpSpPr>
+      <p:sp>
+        <p:nvSpPr>
+          <p:cNvPr id="2" name="Title 1">
+            <a:extLst>
+              <a:ext uri="{FF2B5EF4-FFF2-40B4-BE49-F238E27FC236}">
+                <a16:creationId xmlns:a16="http://schemas.microsoft.com/office/drawing/2014/main" id="{DCD84134-5E9E-4D7C-95CC-F3BC1CA1D5EC}"/>
+              </a:ext>
+            </a:extLst>
+          </p:cNvPr>
+          <p:cNvSpPr>
+            <a:spLocks noGrp="1"/>
+          </p:cNvSpPr>
+          <p:nvPr>
+            <p:ph type="title"/>
+          </p:nvPr>
+        </p:nvSpPr>
+        <p:spPr/>
+        <p:txBody>
+          <a:bodyPr/>
+          <a:lstStyle/>
+          <a:p>
+            <a:r>
+              <a:rPr lang="en-US" dirty="0"/>
+              <a:t>Iterator - </a:t>
+            </a:r>
+            <a:r>
+              <a:rPr lang="en-US" dirty="0" err="1"/>
+              <a:t>štruktúra</a:t>
+            </a:r>
+            <a:endParaRPr lang="en-US" dirty="0"/>
+          </a:p>
+        </p:txBody>
+      </p:sp>
+      <p:pic>
+        <p:nvPicPr>
+          <p:cNvPr id="7" name="Content Placeholder 6" descr="Diagram&#10;&#10;Description automatically generated">
+            <a:extLst>
+              <a:ext uri="{FF2B5EF4-FFF2-40B4-BE49-F238E27FC236}">
+                <a16:creationId xmlns:a16="http://schemas.microsoft.com/office/drawing/2014/main" id="{7E155FDA-A12D-483A-9ACE-099CA053F1BC}"/>
+              </a:ext>
+            </a:extLst>
+          </p:cNvPr>
+          <p:cNvPicPr>
+            <a:picLocks noGrp="1" noChangeAspect="1"/>
+          </p:cNvPicPr>
+          <p:nvPr>
+            <p:ph idx="1"/>
+          </p:nvPr>
+        </p:nvPicPr>
+        <p:blipFill>
+          <a:blip r:embed="rId2">
+            <a:extLst>
+              <a:ext uri="{28A0092B-C50C-407E-A947-70E740481C1C}">
+                <a14:useLocalDpi xmlns:a14="http://schemas.microsoft.com/office/drawing/2010/main" val="0"/>
+              </a:ext>
+            </a:extLst>
+          </a:blip>
+          <a:stretch>
+            <a:fillRect/>
+          </a:stretch>
+        </p:blipFill>
+        <p:spPr>
+          <a:xfrm>
+            <a:off x="2809285" y="1930400"/>
+            <a:ext cx="4332766" cy="3881437"/>
+          </a:xfrm>
+        </p:spPr>
+      </p:pic>
+    </p:spTree>
+    <p:extLst>
+      <p:ext uri="{BB962C8B-B14F-4D97-AF65-F5344CB8AC3E}">
+        <p14:creationId xmlns:p14="http://schemas.microsoft.com/office/powerpoint/2010/main" val="1352413348"/>
+      </p:ext>
+    </p:extLst>
+  </p:cSld>
+  <p:clrMapOvr>
+    <a:masterClrMapping/>
+  </p:clrMapOvr>
+</p:sld>
+</file>
+
+<file path=ppt/slides/slide22.xml><?xml version="1.0" encoding="utf-8"?>
+<p:sld xmlns:a="http://schemas.openxmlformats.org/drawingml/2006/main" xmlns:r="http://schemas.openxmlformats.org/officeDocument/2006/relationships" xmlns:p="http://schemas.openxmlformats.org/presentationml/2006/main">
+  <p:cSld>
+    <p:spTree>
+      <p:nvGrpSpPr>
+        <p:cNvPr id="1" name=""/>
+        <p:cNvGrpSpPr/>
+        <p:nvPr/>
+      </p:nvGrpSpPr>
+      <p:grpSpPr>
+        <a:xfrm>
+          <a:off x="0" y="0"/>
+          <a:ext cx="0" cy="0"/>
+          <a:chOff x="0" y="0"/>
+          <a:chExt cx="0" cy="0"/>
+        </a:xfrm>
+      </p:grpSpPr>
+      <p:sp>
+        <p:nvSpPr>
+          <p:cNvPr id="6" name="Content Placeholder 5">
+            <a:extLst>
+              <a:ext uri="{FF2B5EF4-FFF2-40B4-BE49-F238E27FC236}">
+                <a16:creationId xmlns:a16="http://schemas.microsoft.com/office/drawing/2014/main" id="{06D6DC8E-9AAC-45D7-8E08-6ACB31D31E4A}"/>
+              </a:ext>
+            </a:extLst>
+          </p:cNvPr>
+          <p:cNvSpPr>
+            <a:spLocks noGrp="1"/>
+          </p:cNvSpPr>
+          <p:nvPr>
+            <p:ph idx="1"/>
+          </p:nvPr>
+        </p:nvSpPr>
+        <p:spPr>
+          <a:xfrm>
+            <a:off x="2877609" y="2874965"/>
+            <a:ext cx="5247216" cy="630235"/>
+          </a:xfrm>
+        </p:spPr>
+        <p:txBody>
+          <a:bodyPr>
+            <a:normAutofit/>
+          </a:bodyPr>
+          <a:lstStyle/>
+          <a:p>
+            <a:pPr marL="0" indent="0" algn="ctr">
+              <a:buNone/>
+            </a:pPr>
+            <a:r>
+              <a:rPr lang="en-US" sz="3200" dirty="0" err="1"/>
+              <a:t>Ďakujeme</a:t>
+            </a:r>
+            <a:r>
+              <a:rPr lang="en-US" sz="3200" dirty="0"/>
+              <a:t> za </a:t>
+            </a:r>
+            <a:r>
+              <a:rPr lang="en-US" sz="3200" dirty="0" err="1"/>
+              <a:t>pozornosť</a:t>
+            </a:r>
+            <a:r>
+              <a:rPr lang="en-US" sz="3200" dirty="0"/>
+              <a:t> </a:t>
+            </a:r>
+            <a:r>
+              <a:rPr lang="en-US" sz="3200" dirty="0">
+                <a:sym typeface="Wingdings" panose="05000000000000000000" pitchFamily="2" charset="2"/>
+              </a:rPr>
+              <a:t></a:t>
+            </a:r>
+            <a:endParaRPr lang="en-US" sz="3200" dirty="0"/>
+          </a:p>
+        </p:txBody>
+      </p:sp>
+    </p:spTree>
+    <p:extLst>
+      <p:ext uri="{BB962C8B-B14F-4D97-AF65-F5344CB8AC3E}">
+        <p14:creationId xmlns:p14="http://schemas.microsoft.com/office/powerpoint/2010/main" val="3723738481"/>
+      </p:ext>
+    </p:extLst>
+  </p:cSld>
+  <p:clrMapOvr>
+    <a:masterClrMapping/>
+  </p:clrMapOvr>
+</p:sld>
+</file>
+
+<file path=ppt/slides/slide23.xml><?xml version="1.0" encoding="utf-8"?>
+<p:sld xmlns:a="http://schemas.openxmlformats.org/drawingml/2006/main" xmlns:r="http://schemas.openxmlformats.org/officeDocument/2006/relationships" xmlns:p="http://schemas.openxmlformats.org/presentationml/2006/main">
+  <p:cSld>
+    <p:spTree>
+      <p:nvGrpSpPr>
+        <p:cNvPr id="1" name=""/>
+        <p:cNvGrpSpPr/>
+        <p:nvPr/>
+      </p:nvGrpSpPr>
+      <p:grpSpPr>
+        <a:xfrm>
+          <a:off x="0" y="0"/>
+          <a:ext cx="0" cy="0"/>
+          <a:chOff x="0" y="0"/>
+          <a:chExt cx="0" cy="0"/>
+        </a:xfrm>
+      </p:grpSpPr>
+      <p:sp>
+        <p:nvSpPr>
+          <p:cNvPr id="3" name="Content Placeholder 2">
+            <a:extLst>
+              <a:ext uri="{FF2B5EF4-FFF2-40B4-BE49-F238E27FC236}">
+                <a16:creationId xmlns:a16="http://schemas.microsoft.com/office/drawing/2014/main" id="{E24841CD-DE6F-492E-8B27-145AD86A16B2}"/>
+              </a:ext>
+            </a:extLst>
+          </p:cNvPr>
+          <p:cNvSpPr>
+            <a:spLocks noGrp="1"/>
+          </p:cNvSpPr>
+          <p:nvPr>
+            <p:ph idx="1"/>
+          </p:nvPr>
+        </p:nvSpPr>
+        <p:spPr/>
+        <p:txBody>
+          <a:bodyPr/>
+          <a:lstStyle/>
+          <a:p>
+            <a:r>
+              <a:rPr lang="en-US" dirty="0" err="1"/>
+              <a:t>Zdroje</a:t>
+            </a:r>
+            <a:r>
+              <a:rPr lang="en-US" dirty="0"/>
+              <a:t>:</a:t>
+            </a:r>
+          </a:p>
+          <a:p>
+            <a:pPr marL="0" indent="0">
+              <a:buNone/>
+            </a:pPr>
+            <a:r>
+              <a:rPr lang="en-US" dirty="0">
+                <a:hlinkClick r:id="rId2"/>
+              </a:rPr>
+              <a:t>https://refactoring.guru/design-patterns/iterator</a:t>
+            </a:r>
+            <a:endParaRPr lang="en-US" dirty="0"/>
+          </a:p>
+          <a:p>
+            <a:pPr marL="0" indent="0">
+              <a:buNone/>
+            </a:pPr>
+            <a:r>
+              <a:rPr lang="en-US" dirty="0">
+                <a:hlinkClick r:id="rId3"/>
+              </a:rPr>
+              <a:t>https://refactoring.guru/design-patterns/chain-of-responsibility</a:t>
+            </a:r>
+            <a:endParaRPr lang="en-US" dirty="0"/>
+          </a:p>
+          <a:p>
+            <a:pPr marL="0" indent="0">
+              <a:buNone/>
+            </a:pPr>
+            <a:r>
+              <a:rPr lang="en-US" dirty="0">
+                <a:hlinkClick r:id="rId4"/>
+              </a:rPr>
+              <a:t>https://refactoring.guru/design-patterns/command</a:t>
+            </a:r>
+            <a:endParaRPr lang="en-US" dirty="0"/>
+          </a:p>
+          <a:p>
+            <a:pPr marL="0" indent="0">
+              <a:buNone/>
+            </a:pPr>
+            <a:r>
+              <a:rPr lang="en-US" dirty="0">
+                <a:hlinkClick r:id="rId5"/>
+              </a:rPr>
+              <a:t>https://www.tutorialspoint.com/design_pattern/interpreter_pattern.htm</a:t>
+            </a:r>
+            <a:endParaRPr lang="en-US" dirty="0"/>
+          </a:p>
+        </p:txBody>
+      </p:sp>
+    </p:spTree>
+    <p:extLst>
+      <p:ext uri="{BB962C8B-B14F-4D97-AF65-F5344CB8AC3E}">
+        <p14:creationId xmlns:p14="http://schemas.microsoft.com/office/powerpoint/2010/main" val="1504870091"/>
+      </p:ext>
+    </p:extLst>
+  </p:cSld>
+  <p:clrMapOvr>
+    <a:masterClrMapping/>
+  </p:clrMapOvr>
+</p:sld>
+</file>
+
+<file path=ppt/slides/slide3.xml><?xml version="1.0" encoding="utf-8"?>
+<p:sld xmlns:a="http://schemas.openxmlformats.org/drawingml/2006/main" xmlns:r="http://schemas.openxmlformats.org/officeDocument/2006/relationships" xmlns:p="http://schemas.openxmlformats.org/presentationml/2006/main">
+  <p:cSld>
+    <p:spTree>
+      <p:nvGrpSpPr>
+        <p:cNvPr id="1" name=""/>
+        <p:cNvGrpSpPr/>
+        <p:nvPr/>
+      </p:nvGrpSpPr>
+      <p:grpSpPr>
+        <a:xfrm>
+          <a:off x="0" y="0"/>
+          <a:ext cx="0" cy="0"/>
+          <a:chOff x="0" y="0"/>
+          <a:chExt cx="0" cy="0"/>
+        </a:xfrm>
+      </p:grpSpPr>
+      <p:sp>
+        <p:nvSpPr>
           <p:cNvPr id="2" name="Nadpis 1">
             <a:extLst>
               <a:ext uri="{FF2B5EF4-FFF2-40B4-BE49-F238E27FC236}">
@@ -6013,20 +8375,8 @@
           <a:lstStyle/>
           <a:p>
             <a:r>
-              <a:rPr lang="sk-SK" dirty="0" err="1"/>
-              <a:t>Behavioral</a:t>
-            </a:r>
-            <a:r>
               <a:rPr lang="sk-SK" dirty="0"/>
-              <a:t> </a:t>
-            </a:r>
-            <a:r>
-              <a:rPr lang="sk-SK" dirty="0" err="1"/>
-              <a:t>Patterns</a:t>
-            </a:r>
-            <a:r>
-              <a:rPr lang="sk-SK" dirty="0"/>
-              <a:t> sa zaujímajú o chovanie systému. </a:t>
+              <a:t>Behavioral Patterns sa zaujímajú o chovanie systému</a:t>
             </a:r>
           </a:p>
           <a:p>
@@ -6062,7 +8412,7 @@
 </p:sld>
 </file>
 
-<file path=ppt/slides/slide3.xml><?xml version="1.0" encoding="utf-8"?>
+<file path=ppt/slides/slide4.xml><?xml version="1.0" encoding="utf-8"?>
 <p:sld xmlns:a="http://schemas.openxmlformats.org/drawingml/2006/main" xmlns:r="http://schemas.openxmlformats.org/officeDocument/2006/relationships" xmlns:p="http://schemas.openxmlformats.org/presentationml/2006/main">
   <p:cSld>
     <p:spTree>
@@ -6178,7 +8528,7 @@
 </p:sld>
 </file>
 
-<file path=ppt/slides/slide4.xml><?xml version="1.0" encoding="utf-8"?>
+<file path=ppt/slides/slide5.xml><?xml version="1.0" encoding="utf-8"?>
 <p:sld xmlns:a="http://schemas.openxmlformats.org/drawingml/2006/main" xmlns:r="http://schemas.openxmlformats.org/officeDocument/2006/relationships" xmlns:p="http://schemas.openxmlformats.org/presentationml/2006/main">
   <p:cSld>
     <p:spTree>
@@ -6297,7 +8647,7 @@
 </p:sld>
 </file>
 
-<file path=ppt/slides/slide5.xml><?xml version="1.0" encoding="utf-8"?>
+<file path=ppt/slides/slide6.xml><?xml version="1.0" encoding="utf-8"?>
 <p:sld xmlns:a="http://schemas.openxmlformats.org/drawingml/2006/main" xmlns:r="http://schemas.openxmlformats.org/officeDocument/2006/relationships" xmlns:p="http://schemas.openxmlformats.org/presentationml/2006/main">
   <p:cSld>
     <p:spTree>
@@ -6416,7 +8766,7 @@
 </p:sld>
 </file>
 
-<file path=ppt/slides/slide6.xml><?xml version="1.0" encoding="utf-8"?>
+<file path=ppt/slides/slide7.xml><?xml version="1.0" encoding="utf-8"?>
 <p:sld xmlns:a="http://schemas.openxmlformats.org/drawingml/2006/main" xmlns:r="http://schemas.openxmlformats.org/officeDocument/2006/relationships" xmlns:p="http://schemas.openxmlformats.org/presentationml/2006/main">
   <p:cSld>
     <p:spTree>
@@ -6535,7 +8885,7 @@
 </p:sld>
 </file>
 
-<file path=ppt/slides/slide7.xml><?xml version="1.0" encoding="utf-8"?>
+<file path=ppt/slides/slide8.xml><?xml version="1.0" encoding="utf-8"?>
 <p:sld xmlns:a="http://schemas.openxmlformats.org/drawingml/2006/main" xmlns:r="http://schemas.openxmlformats.org/officeDocument/2006/relationships" xmlns:p="http://schemas.openxmlformats.org/presentationml/2006/main">
   <p:cSld>
     <p:spTree>
@@ -6654,7 +9004,7 @@
 </p:sld>
 </file>
 
-<file path=ppt/slides/slide8.xml><?xml version="1.0" encoding="utf-8"?>
+<file path=ppt/slides/slide9.xml><?xml version="1.0" encoding="utf-8"?>
 <p:sld xmlns:a="http://schemas.openxmlformats.org/drawingml/2006/main" xmlns:r="http://schemas.openxmlformats.org/officeDocument/2006/relationships" xmlns:p="http://schemas.openxmlformats.org/presentationml/2006/main">
   <p:cSld>
     <p:spTree>
@@ -6764,125 +9114,6 @@
     <p:extLst>
       <p:ext uri="{BB962C8B-B14F-4D97-AF65-F5344CB8AC3E}">
         <p14:creationId xmlns:p14="http://schemas.microsoft.com/office/powerpoint/2010/main" val="111544870"/>
-      </p:ext>
-    </p:extLst>
-  </p:cSld>
-  <p:clrMapOvr>
-    <a:masterClrMapping/>
-  </p:clrMapOvr>
-</p:sld>
-</file>
-
-<file path=ppt/slides/slide9.xml><?xml version="1.0" encoding="utf-8"?>
-<p:sld xmlns:a="http://schemas.openxmlformats.org/drawingml/2006/main" xmlns:r="http://schemas.openxmlformats.org/officeDocument/2006/relationships" xmlns:p="http://schemas.openxmlformats.org/presentationml/2006/main">
-  <p:cSld>
-    <p:spTree>
-      <p:nvGrpSpPr>
-        <p:cNvPr id="1" name=""/>
-        <p:cNvGrpSpPr/>
-        <p:nvPr/>
-      </p:nvGrpSpPr>
-      <p:grpSpPr>
-        <a:xfrm>
-          <a:off x="0" y="0"/>
-          <a:ext cx="0" cy="0"/>
-          <a:chOff x="0" y="0"/>
-          <a:chExt cx="0" cy="0"/>
-        </a:xfrm>
-      </p:grpSpPr>
-      <p:sp>
-        <p:nvSpPr>
-          <p:cNvPr id="2" name="Nadpis 1">
-            <a:extLst>
-              <a:ext uri="{FF2B5EF4-FFF2-40B4-BE49-F238E27FC236}">
-                <a16:creationId xmlns:a16="http://schemas.microsoft.com/office/drawing/2014/main" id="{591A6B69-96CE-55D5-96F6-D1DE5F9F0746}"/>
-              </a:ext>
-            </a:extLst>
-          </p:cNvPr>
-          <p:cNvSpPr>
-            <a:spLocks noGrp="1"/>
-          </p:cNvSpPr>
-          <p:nvPr>
-            <p:ph type="title"/>
-          </p:nvPr>
-        </p:nvSpPr>
-        <p:spPr/>
-        <p:txBody>
-          <a:bodyPr/>
-          <a:lstStyle/>
-          <a:p>
-            <a:r>
-              <a:rPr lang="sk-SK" dirty="0" err="1"/>
-              <a:t>Chain</a:t>
-            </a:r>
-            <a:r>
-              <a:rPr lang="sk-SK" dirty="0"/>
-              <a:t> of </a:t>
-            </a:r>
-            <a:r>
-              <a:rPr lang="sk-SK" dirty="0" err="1"/>
-              <a:t>Responibility</a:t>
-            </a:r>
-            <a:r>
-              <a:rPr lang="sk-SK" dirty="0"/>
-              <a:t> - štruktúra</a:t>
-            </a:r>
-          </a:p>
-        </p:txBody>
-      </p:sp>
-      <p:pic>
-        <p:nvPicPr>
-          <p:cNvPr id="4098" name="Picture 2" descr="Structure of the Chain Of Responsibility design pattern">
-            <a:extLst>
-              <a:ext uri="{FF2B5EF4-FFF2-40B4-BE49-F238E27FC236}">
-                <a16:creationId xmlns:a16="http://schemas.microsoft.com/office/drawing/2014/main" id="{49D6E090-7C4F-45B0-FE97-95D35FF11828}"/>
-              </a:ext>
-            </a:extLst>
-          </p:cNvPr>
-          <p:cNvPicPr>
-            <a:picLocks noGrp="1" noChangeAspect="1" noChangeArrowheads="1"/>
-          </p:cNvPicPr>
-          <p:nvPr>
-            <p:ph idx="1"/>
-          </p:nvPr>
-        </p:nvPicPr>
-        <p:blipFill>
-          <a:blip r:embed="rId2">
-            <a:extLst>
-              <a:ext uri="{28A0092B-C50C-407E-A947-70E740481C1C}">
-                <a14:useLocalDpi xmlns:a14="http://schemas.microsoft.com/office/drawing/2010/main" val="0"/>
-              </a:ext>
-            </a:extLst>
-          </a:blip>
-          <a:srcRect/>
-          <a:stretch>
-            <a:fillRect/>
-          </a:stretch>
-        </p:blipFill>
-        <p:spPr bwMode="auto">
-          <a:xfrm>
-            <a:off x="3177304" y="2160588"/>
-            <a:ext cx="3597429" cy="3881437"/>
-          </a:xfrm>
-          <a:prstGeom prst="rect">
-            <a:avLst/>
-          </a:prstGeom>
-          <a:noFill/>
-          <a:extLst>
-            <a:ext uri="{909E8E84-426E-40DD-AFC4-6F175D3DCCD1}">
-              <a14:hiddenFill xmlns:a14="http://schemas.microsoft.com/office/drawing/2010/main">
-                <a:solidFill>
-                  <a:srgbClr val="FFFFFF"/>
-                </a:solidFill>
-              </a14:hiddenFill>
-            </a:ext>
-          </a:extLst>
-        </p:spPr>
-      </p:pic>
-    </p:spTree>
-    <p:extLst>
-      <p:ext uri="{BB962C8B-B14F-4D97-AF65-F5344CB8AC3E}">
-        <p14:creationId xmlns:p14="http://schemas.microsoft.com/office/powerpoint/2010/main" val="773094169"/>
       </p:ext>
     </p:extLst>
   </p:cSld>

</xml_diff>

<commit_message>
Change background in presentation
</commit_message>
<xml_diff>
--- a/Behavioral_Design_Patterns.pptx
+++ b/Behavioral_Design_Patterns.pptx
@@ -7428,9 +7428,7 @@
     <p:bg>
       <p:bgPr>
         <a:solidFill>
-          <a:schemeClr val="tx2">
-            <a:lumMod val="75000"/>
-          </a:schemeClr>
+          <a:schemeClr val="bg1"/>
         </a:solidFill>
         <a:effectLst/>
       </p:bgPr>
@@ -7516,13 +7514,7 @@
             <a:avLst/>
           </a:prstGeom>
           <a:noFill/>
-          <a:effectLst>
-            <a:glow rad="127000">
-              <a:schemeClr val="bg1">
-                <a:lumMod val="65000"/>
-              </a:schemeClr>
-            </a:glow>
-          </a:effectLst>
+          <a:effectLst/>
           <a:extLst>
             <a:ext uri="{909E8E84-426E-40DD-AFC4-6F175D3DCCD1}">
               <a14:hiddenFill xmlns:a14="http://schemas.microsoft.com/office/drawing/2010/main">
@@ -8234,9 +8226,7 @@
     <p:bg>
       <p:bgPr>
         <a:solidFill>
-          <a:schemeClr val="tx2">
-            <a:lumMod val="75000"/>
-          </a:schemeClr>
+          <a:schemeClr val="bg1"/>
         </a:solidFill>
         <a:effectLst/>
       </p:bgPr>
@@ -9607,9 +9597,7 @@
     <p:bg>
       <p:bgPr>
         <a:solidFill>
-          <a:schemeClr val="tx2">
-            <a:lumMod val="75000"/>
-          </a:schemeClr>
+          <a:schemeClr val="bg1"/>
         </a:solidFill>
         <a:effectLst/>
       </p:bgPr>
@@ -9752,9 +9740,7 @@
     <p:bg>
       <p:bgPr>
         <a:solidFill>
-          <a:schemeClr val="tx2">
-            <a:lumMod val="75000"/>
-          </a:schemeClr>
+          <a:schemeClr val="bg1"/>
         </a:solidFill>
         <a:effectLst/>
       </p:bgPr>
@@ -9876,13 +9862,7 @@
           <a:prstGeom prst="rect">
             <a:avLst/>
           </a:prstGeom>
-          <a:effectLst>
-            <a:glow rad="127000">
-              <a:schemeClr val="bg1">
-                <a:lumMod val="65000"/>
-              </a:schemeClr>
-            </a:glow>
-          </a:effectLst>
+          <a:effectLst/>
         </p:spPr>
       </p:pic>
     </p:spTree>
@@ -13074,9 +13054,7 @@
     <p:bg>
       <p:bgPr>
         <a:solidFill>
-          <a:schemeClr val="tx2">
-            <a:lumMod val="75000"/>
-          </a:schemeClr>
+          <a:schemeClr val="bg1"/>
         </a:solidFill>
         <a:effectLst/>
       </p:bgPr>
@@ -13182,9 +13160,7 @@
     <p:bg>
       <p:bgPr>
         <a:solidFill>
-          <a:schemeClr val="tx2">
-            <a:lumMod val="75000"/>
-          </a:schemeClr>
+          <a:schemeClr val="bg1"/>
         </a:solidFill>
         <a:effectLst/>
       </p:bgPr>
@@ -13269,13 +13245,7 @@
             <a:off x="2809285" y="1930400"/>
             <a:ext cx="4332766" cy="3881437"/>
           </a:xfrm>
-          <a:effectLst>
-            <a:glow rad="127000">
-              <a:schemeClr val="bg1">
-                <a:lumMod val="65000"/>
-              </a:schemeClr>
-            </a:glow>
-          </a:effectLst>
+          <a:effectLst/>
         </p:spPr>
       </p:pic>
     </p:spTree>
@@ -13297,9 +13267,7 @@
     <p:bg>
       <p:bgPr>
         <a:solidFill>
-          <a:schemeClr val="tx2">
-            <a:lumMod val="75000"/>
-          </a:schemeClr>
+          <a:schemeClr val="bg1"/>
         </a:solidFill>
         <a:effectLst/>
       </p:bgPr>

</xml_diff>

<commit_message>
Add question to presentation
</commit_message>
<xml_diff>
--- a/Behavioral_Design_Patterns.pptx
+++ b/Behavioral_Design_Patterns.pptx
@@ -33,6 +33,7 @@
     <p:sldId id="291" r:id="rId27"/>
     <p:sldId id="278" r:id="rId28"/>
     <p:sldId id="279" r:id="rId29"/>
+    <p:sldId id="292" r:id="rId30"/>
   </p:sldIdLst>
   <p:sldSz cx="12192000" cy="6858000"/>
   <p:notesSz cx="6858000" cy="9144000"/>
@@ -13811,6 +13812,298 @@
 </p:sld>
 </file>
 
+<file path=ppt/slides/slide29.xml><?xml version="1.0" encoding="utf-8"?>
+<p:sld xmlns:a="http://schemas.openxmlformats.org/drawingml/2006/main" xmlns:r="http://schemas.openxmlformats.org/officeDocument/2006/relationships" xmlns:p="http://schemas.openxmlformats.org/presentationml/2006/main">
+  <p:cSld>
+    <p:bg>
+      <p:bgPr>
+        <a:solidFill>
+          <a:schemeClr val="tx2">
+            <a:lumMod val="75000"/>
+          </a:schemeClr>
+        </a:solidFill>
+        <a:effectLst/>
+      </p:bgPr>
+    </p:bg>
+    <p:spTree>
+      <p:nvGrpSpPr>
+        <p:cNvPr id="1" name=""/>
+        <p:cNvGrpSpPr/>
+        <p:nvPr/>
+      </p:nvGrpSpPr>
+      <p:grpSpPr>
+        <a:xfrm>
+          <a:off x="0" y="0"/>
+          <a:ext cx="0" cy="0"/>
+          <a:chOff x="0" y="0"/>
+          <a:chExt cx="0" cy="0"/>
+        </a:xfrm>
+      </p:grpSpPr>
+      <p:sp>
+        <p:nvSpPr>
+          <p:cNvPr id="2" name="Nadpis 1">
+            <a:extLst>
+              <a:ext uri="{FF2B5EF4-FFF2-40B4-BE49-F238E27FC236}">
+                <a16:creationId xmlns:a16="http://schemas.microsoft.com/office/drawing/2014/main" id="{3AE5A288-E3F8-0351-FF0C-163ADC355D1D}"/>
+              </a:ext>
+            </a:extLst>
+          </p:cNvPr>
+          <p:cNvSpPr>
+            <a:spLocks noGrp="1"/>
+          </p:cNvSpPr>
+          <p:nvPr>
+            <p:ph type="title"/>
+          </p:nvPr>
+        </p:nvSpPr>
+        <p:spPr/>
+        <p:txBody>
+          <a:bodyPr/>
+          <a:lstStyle/>
+          <a:p>
+            <a:r>
+              <a:rPr lang="sk-SK" dirty="0"/>
+              <a:t>Otázka na skúšku	</a:t>
+            </a:r>
+          </a:p>
+        </p:txBody>
+      </p:sp>
+      <p:sp>
+        <p:nvSpPr>
+          <p:cNvPr id="3" name="Zástupný objekt pre obsah 2">
+            <a:extLst>
+              <a:ext uri="{FF2B5EF4-FFF2-40B4-BE49-F238E27FC236}">
+                <a16:creationId xmlns:a16="http://schemas.microsoft.com/office/drawing/2014/main" id="{8DE11AB9-113E-EF93-3A46-2B78ECC39F8A}"/>
+              </a:ext>
+            </a:extLst>
+          </p:cNvPr>
+          <p:cNvSpPr>
+            <a:spLocks noGrp="1"/>
+          </p:cNvSpPr>
+          <p:nvPr>
+            <p:ph idx="1"/>
+          </p:nvPr>
+        </p:nvSpPr>
+        <p:spPr/>
+        <p:txBody>
+          <a:bodyPr/>
+          <a:lstStyle/>
+          <a:p>
+            <a:r>
+              <a:rPr lang="sk-SK" dirty="0">
+                <a:solidFill>
+                  <a:schemeClr val="bg1"/>
+                </a:solidFill>
+              </a:rPr>
+              <a:t>Čo nepatrí do štruktúry </a:t>
+            </a:r>
+            <a:r>
+              <a:rPr lang="sk-SK" dirty="0" err="1">
+                <a:solidFill>
+                  <a:schemeClr val="bg1"/>
+                </a:solidFill>
+              </a:rPr>
+              <a:t>Iterator</a:t>
+            </a:r>
+            <a:r>
+              <a:rPr lang="sk-SK" dirty="0">
+                <a:solidFill>
+                  <a:schemeClr val="bg1"/>
+                </a:solidFill>
+              </a:rPr>
+              <a:t> ?</a:t>
+            </a:r>
+          </a:p>
+          <a:p>
+            <a:pPr marL="0" indent="0">
+              <a:buNone/>
+            </a:pPr>
+            <a:r>
+              <a:rPr lang="sk-SK" dirty="0">
+                <a:solidFill>
+                  <a:schemeClr val="bg1"/>
+                </a:solidFill>
+              </a:rPr>
+              <a:t>	a) </a:t>
+            </a:r>
+            <a:r>
+              <a:rPr lang="sk-SK" dirty="0" err="1">
+                <a:solidFill>
+                  <a:schemeClr val="bg1"/>
+                </a:solidFill>
+              </a:rPr>
+              <a:t>Iterator</a:t>
+            </a:r>
+            <a:endParaRPr lang="sk-SK" dirty="0">
+              <a:solidFill>
+                <a:schemeClr val="bg1"/>
+              </a:solidFill>
+            </a:endParaRPr>
+          </a:p>
+          <a:p>
+            <a:pPr marL="0" indent="0">
+              <a:buNone/>
+            </a:pPr>
+            <a:r>
+              <a:rPr lang="sk-SK" dirty="0">
+                <a:solidFill>
+                  <a:schemeClr val="bg1"/>
+                </a:solidFill>
+              </a:rPr>
+              <a:t>	b) </a:t>
+            </a:r>
+            <a:r>
+              <a:rPr lang="sk-SK" dirty="0" err="1">
+                <a:solidFill>
+                  <a:schemeClr val="bg1"/>
+                </a:solidFill>
+              </a:rPr>
+              <a:t>Iterator</a:t>
+            </a:r>
+            <a:r>
+              <a:rPr lang="sk-SK" dirty="0">
+                <a:solidFill>
+                  <a:schemeClr val="bg1"/>
+                </a:solidFill>
+              </a:rPr>
+              <a:t> </a:t>
+            </a:r>
+            <a:r>
+              <a:rPr lang="sk-SK" dirty="0" err="1">
+                <a:solidFill>
+                  <a:schemeClr val="bg1"/>
+                </a:solidFill>
+              </a:rPr>
+              <a:t>Collection</a:t>
+            </a:r>
+            <a:endParaRPr lang="sk-SK" dirty="0">
+              <a:solidFill>
+                <a:schemeClr val="bg1"/>
+              </a:solidFill>
+            </a:endParaRPr>
+          </a:p>
+          <a:p>
+            <a:pPr marL="0" indent="0">
+              <a:buNone/>
+            </a:pPr>
+            <a:r>
+              <a:rPr lang="sk-SK" dirty="0">
+                <a:solidFill>
+                  <a:schemeClr val="bg1"/>
+                </a:solidFill>
+              </a:rPr>
+              <a:t>	</a:t>
+            </a:r>
+            <a:r>
+              <a:rPr lang="sk-SK" b="1" dirty="0">
+                <a:solidFill>
+                  <a:srgbClr val="00B050"/>
+                </a:solidFill>
+              </a:rPr>
+              <a:t>c) </a:t>
+            </a:r>
+            <a:r>
+              <a:rPr lang="sk-SK" b="1" dirty="0" err="1">
+                <a:solidFill>
+                  <a:srgbClr val="00B050"/>
+                </a:solidFill>
+              </a:rPr>
+              <a:t>Product</a:t>
+            </a:r>
+            <a:r>
+              <a:rPr lang="sk-SK" b="1" dirty="0">
+                <a:solidFill>
+                  <a:srgbClr val="00B050"/>
+                </a:solidFill>
+              </a:rPr>
+              <a:t> ✓</a:t>
+            </a:r>
+          </a:p>
+          <a:p>
+            <a:pPr marL="0" indent="0">
+              <a:buNone/>
+            </a:pPr>
+            <a:r>
+              <a:rPr lang="sk-SK" dirty="0">
+                <a:solidFill>
+                  <a:schemeClr val="bg1"/>
+                </a:solidFill>
+              </a:rPr>
+              <a:t>	d) </a:t>
+            </a:r>
+            <a:r>
+              <a:rPr lang="sk-SK" dirty="0" err="1">
+                <a:solidFill>
+                  <a:schemeClr val="bg1"/>
+                </a:solidFill>
+              </a:rPr>
+              <a:t>Client</a:t>
+            </a:r>
+            <a:r>
+              <a:rPr lang="sk-SK" dirty="0">
+                <a:solidFill>
+                  <a:schemeClr val="bg1"/>
+                </a:solidFill>
+              </a:rPr>
+              <a:t>	</a:t>
+            </a:r>
+          </a:p>
+          <a:p>
+            <a:pPr marL="0" indent="0">
+              <a:buNone/>
+            </a:pPr>
+            <a:r>
+              <a:rPr lang="sk-SK" dirty="0">
+                <a:solidFill>
+                  <a:schemeClr val="bg1"/>
+                </a:solidFill>
+              </a:rPr>
+              <a:t>	e) </a:t>
+            </a:r>
+            <a:r>
+              <a:rPr lang="sk-SK" dirty="0" err="1">
+                <a:solidFill>
+                  <a:schemeClr val="bg1"/>
+                </a:solidFill>
+              </a:rPr>
+              <a:t>Concrete</a:t>
+            </a:r>
+            <a:r>
+              <a:rPr lang="sk-SK" dirty="0">
+                <a:solidFill>
+                  <a:schemeClr val="bg1"/>
+                </a:solidFill>
+              </a:rPr>
+              <a:t> </a:t>
+            </a:r>
+            <a:r>
+              <a:rPr lang="sk-SK" dirty="0" err="1">
+                <a:solidFill>
+                  <a:schemeClr val="bg1"/>
+                </a:solidFill>
+              </a:rPr>
+              <a:t>Collection</a:t>
+            </a:r>
+            <a:endParaRPr lang="sk-SK" dirty="0">
+              <a:solidFill>
+                <a:schemeClr val="bg1"/>
+              </a:solidFill>
+            </a:endParaRPr>
+          </a:p>
+        </p:txBody>
+      </p:sp>
+    </p:spTree>
+    <p:extLst>
+      <p:ext uri="{BB962C8B-B14F-4D97-AF65-F5344CB8AC3E}">
+        <p14:creationId xmlns:p14="http://schemas.microsoft.com/office/powerpoint/2010/main" val="3024849562"/>
+      </p:ext>
+    </p:extLst>
+  </p:cSld>
+  <p:clrMapOvr>
+    <a:masterClrMapping/>
+  </p:clrMapOvr>
+</p:sld>
+</file>
+
 <file path=ppt/slides/slide3.xml><?xml version="1.0" encoding="utf-8"?>
 <p:sld xmlns:a="http://schemas.openxmlformats.org/drawingml/2006/main" xmlns:r="http://schemas.openxmlformats.org/officeDocument/2006/relationships" xmlns:p="http://schemas.openxmlformats.org/presentationml/2006/main">
   <p:cSld>

</xml_diff>